<commit_message>
add wip on the presentationÄ
</commit_message>
<xml_diff>
--- a/content/presentation/Presentation-Stream-Processing.pptx
+++ b/content/presentation/Presentation-Stream-Processing.pptx
@@ -5,15 +5,16 @@
     <p:sldMasterId id="2147483648" r:id="rId1"/>
   </p:sldMasterIdLst>
   <p:notesMasterIdLst>
-    <p:notesMasterId r:id="rId5"/>
+    <p:notesMasterId r:id="rId6"/>
   </p:notesMasterIdLst>
   <p:handoutMasterIdLst>
-    <p:handoutMasterId r:id="rId6"/>
+    <p:handoutMasterId r:id="rId7"/>
   </p:handoutMasterIdLst>
   <p:sldIdLst>
     <p:sldId id="1944" r:id="rId2"/>
     <p:sldId id="1943" r:id="rId3"/>
-    <p:sldId id="1945" r:id="rId4"/>
+    <p:sldId id="1946" r:id="rId4"/>
+    <p:sldId id="1945" r:id="rId5"/>
   </p:sldIdLst>
   <p:sldSz cx="9144000" cy="6858000" type="screen4x3"/>
   <p:notesSz cx="6858000" cy="9661525"/>
@@ -23,7 +24,7 @@
     </p:custShow>
   </p:custShowLst>
   <p:custDataLst>
-    <p:tags r:id="rId7"/>
+    <p:tags r:id="rId8"/>
   </p:custDataLst>
   <p:defaultTextStyle>
     <a:defPPr>
@@ -288,14 +289,14 @@
           <a:effectLst/>
           <a:extLst>
             <a:ext uri="{909E8E84-426E-40dd-AFC4-6F175D3DCCD1}">
-              <a14:hiddenFill xmlns="" xmlns:a14="http://schemas.microsoft.com/office/drawing/2010/main">
+              <a14:hiddenFill xmlns:a14="http://schemas.microsoft.com/office/drawing/2010/main" xmlns="">
                 <a:solidFill>
                   <a:schemeClr val="accent1"/>
                 </a:solidFill>
               </a14:hiddenFill>
             </a:ext>
             <a:ext uri="{91240B29-F687-4f45-9708-019B960494DF}">
-              <a14:hiddenLine xmlns="" xmlns:a14="http://schemas.microsoft.com/office/drawing/2010/main" w="9525">
+              <a14:hiddenLine xmlns:a14="http://schemas.microsoft.com/office/drawing/2010/main" xmlns="" w="9525">
                 <a:solidFill>
                   <a:schemeClr val="tx1"/>
                 </a:solidFill>
@@ -305,7 +306,7 @@
               </a14:hiddenLine>
             </a:ext>
             <a:ext uri="{AF507438-7753-43e0-B8FC-AC1667EBCBE1}">
-              <a14:hiddenEffects xmlns="" xmlns:a14="http://schemas.microsoft.com/office/drawing/2010/main">
+              <a14:hiddenEffects xmlns:a14="http://schemas.microsoft.com/office/drawing/2010/main" xmlns="">
                 <a:effectLst>
                   <a:outerShdw blurRad="63500" dist="38099" dir="2700000" algn="ctr" rotWithShape="0">
                     <a:schemeClr val="bg2">
@@ -316,7 +317,7 @@
               </a14:hiddenEffects>
             </a:ext>
             <a:ext uri="{FAA26D3D-D897-4be2-8F04-BA451C77F1D7}">
-              <ma14:placeholderFlag xmlns="" xmlns:ma14="http://schemas.microsoft.com/office/mac/drawingml/2011/main" val="1"/>
+              <ma14:placeholderFlag xmlns:ma14="http://schemas.microsoft.com/office/mac/drawingml/2011/main" xmlns="" val="1"/>
             </a:ext>
           </a:extLst>
         </p:spPr>
@@ -366,14 +367,14 @@
           <a:effectLst/>
           <a:extLst>
             <a:ext uri="{909E8E84-426E-40dd-AFC4-6F175D3DCCD1}">
-              <a14:hiddenFill xmlns="" xmlns:a14="http://schemas.microsoft.com/office/drawing/2010/main">
+              <a14:hiddenFill xmlns:a14="http://schemas.microsoft.com/office/drawing/2010/main" xmlns="">
                 <a:solidFill>
                   <a:schemeClr val="accent1"/>
                 </a:solidFill>
               </a14:hiddenFill>
             </a:ext>
             <a:ext uri="{91240B29-F687-4f45-9708-019B960494DF}">
-              <a14:hiddenLine xmlns="" xmlns:a14="http://schemas.microsoft.com/office/drawing/2010/main" w="9525">
+              <a14:hiddenLine xmlns:a14="http://schemas.microsoft.com/office/drawing/2010/main" xmlns="" w="9525">
                 <a:solidFill>
                   <a:schemeClr val="tx1"/>
                 </a:solidFill>
@@ -383,7 +384,7 @@
               </a14:hiddenLine>
             </a:ext>
             <a:ext uri="{AF507438-7753-43e0-B8FC-AC1667EBCBE1}">
-              <a14:hiddenEffects xmlns="" xmlns:a14="http://schemas.microsoft.com/office/drawing/2010/main">
+              <a14:hiddenEffects xmlns:a14="http://schemas.microsoft.com/office/drawing/2010/main" xmlns="">
                 <a:effectLst>
                   <a:outerShdw blurRad="63500" dist="38099" dir="2700000" algn="ctr" rotWithShape="0">
                     <a:schemeClr val="bg2">
@@ -394,7 +395,7 @@
               </a14:hiddenEffects>
             </a:ext>
             <a:ext uri="{FAA26D3D-D897-4be2-8F04-BA451C77F1D7}">
-              <ma14:placeholderFlag xmlns="" xmlns:ma14="http://schemas.microsoft.com/office/mac/drawingml/2011/main" val="1"/>
+              <ma14:placeholderFlag xmlns:ma14="http://schemas.microsoft.com/office/mac/drawingml/2011/main" xmlns="" val="1"/>
             </a:ext>
           </a:extLst>
         </p:spPr>
@@ -444,14 +445,14 @@
           <a:effectLst/>
           <a:extLst>
             <a:ext uri="{909E8E84-426E-40dd-AFC4-6F175D3DCCD1}">
-              <a14:hiddenFill xmlns="" xmlns:a14="http://schemas.microsoft.com/office/drawing/2010/main">
+              <a14:hiddenFill xmlns:a14="http://schemas.microsoft.com/office/drawing/2010/main" xmlns="">
                 <a:solidFill>
                   <a:schemeClr val="accent1"/>
                 </a:solidFill>
               </a14:hiddenFill>
             </a:ext>
             <a:ext uri="{91240B29-F687-4f45-9708-019B960494DF}">
-              <a14:hiddenLine xmlns="" xmlns:a14="http://schemas.microsoft.com/office/drawing/2010/main" w="9525">
+              <a14:hiddenLine xmlns:a14="http://schemas.microsoft.com/office/drawing/2010/main" xmlns="" w="9525">
                 <a:solidFill>
                   <a:schemeClr val="tx1"/>
                 </a:solidFill>
@@ -461,7 +462,7 @@
               </a14:hiddenLine>
             </a:ext>
             <a:ext uri="{AF507438-7753-43e0-B8FC-AC1667EBCBE1}">
-              <a14:hiddenEffects xmlns="" xmlns:a14="http://schemas.microsoft.com/office/drawing/2010/main">
+              <a14:hiddenEffects xmlns:a14="http://schemas.microsoft.com/office/drawing/2010/main" xmlns="">
                 <a:effectLst>
                   <a:outerShdw blurRad="63500" dist="38099" dir="2700000" algn="ctr" rotWithShape="0">
                     <a:schemeClr val="bg2">
@@ -472,7 +473,7 @@
               </a14:hiddenEffects>
             </a:ext>
             <a:ext uri="{FAA26D3D-D897-4be2-8F04-BA451C77F1D7}">
-              <ma14:placeholderFlag xmlns="" xmlns:ma14="http://schemas.microsoft.com/office/mac/drawingml/2011/main" val="1"/>
+              <ma14:placeholderFlag xmlns:ma14="http://schemas.microsoft.com/office/mac/drawingml/2011/main" xmlns="" val="1"/>
             </a:ext>
           </a:extLst>
         </p:spPr>
@@ -522,14 +523,14 @@
           <a:effectLst/>
           <a:extLst>
             <a:ext uri="{909E8E84-426E-40dd-AFC4-6F175D3DCCD1}">
-              <a14:hiddenFill xmlns="" xmlns:a14="http://schemas.microsoft.com/office/drawing/2010/main">
+              <a14:hiddenFill xmlns:a14="http://schemas.microsoft.com/office/drawing/2010/main" xmlns="">
                 <a:solidFill>
                   <a:schemeClr val="accent1"/>
                 </a:solidFill>
               </a14:hiddenFill>
             </a:ext>
             <a:ext uri="{91240B29-F687-4f45-9708-019B960494DF}">
-              <a14:hiddenLine xmlns="" xmlns:a14="http://schemas.microsoft.com/office/drawing/2010/main" w="9525">
+              <a14:hiddenLine xmlns:a14="http://schemas.microsoft.com/office/drawing/2010/main" xmlns="" w="9525">
                 <a:solidFill>
                   <a:schemeClr val="tx1"/>
                 </a:solidFill>
@@ -539,7 +540,7 @@
               </a14:hiddenLine>
             </a:ext>
             <a:ext uri="{AF507438-7753-43e0-B8FC-AC1667EBCBE1}">
-              <a14:hiddenEffects xmlns="" xmlns:a14="http://schemas.microsoft.com/office/drawing/2010/main">
+              <a14:hiddenEffects xmlns:a14="http://schemas.microsoft.com/office/drawing/2010/main" xmlns="">
                 <a:effectLst>
                   <a:outerShdw blurRad="63500" dist="38099" dir="2700000" algn="ctr" rotWithShape="0">
                     <a:schemeClr val="bg2">
@@ -550,7 +551,7 @@
               </a14:hiddenEffects>
             </a:ext>
             <a:ext uri="{FAA26D3D-D897-4be2-8F04-BA451C77F1D7}">
-              <ma14:placeholderFlag xmlns="" xmlns:ma14="http://schemas.microsoft.com/office/mac/drawingml/2011/main" val="1"/>
+              <ma14:placeholderFlag xmlns:ma14="http://schemas.microsoft.com/office/mac/drawingml/2011/main" xmlns="" val="1"/>
             </a:ext>
           </a:extLst>
         </p:spPr>
@@ -574,7 +575,7 @@
             <a:fld id="{D54606BC-1185-6343-8CD4-1A7CC7DA3AB6}" type="slidenum">
               <a:rPr lang="de-DE"/>
               <a:pPr/>
-              <a:t>‹Nr.›</a:t>
+              <a:t>‹#›</a:t>
             </a:fld>
             <a:endParaRPr lang="de-DE"/>
           </a:p>
@@ -646,7 +647,7 @@
           <a:effectLst/>
           <a:extLst>
             <a:ext uri="{AF507438-7753-43e0-B8FC-AC1667EBCBE1}">
-              <a14:hiddenEffects xmlns="" xmlns:a14="http://schemas.microsoft.com/office/drawing/2010/main">
+              <a14:hiddenEffects xmlns:a14="http://schemas.microsoft.com/office/drawing/2010/main" xmlns="">
                 <a:effectLst>
                   <a:outerShdw blurRad="63500" dist="38099" dir="2700000" algn="ctr" rotWithShape="0">
                     <a:srgbClr val="000000">
@@ -657,7 +658,7 @@
               </a14:hiddenEffects>
             </a:ext>
             <a:ext uri="{53640926-AAD7-44d8-BBD7-CCE9431645EC}">
-              <a14:shadowObscured xmlns="" xmlns:a14="http://schemas.microsoft.com/office/drawing/2010/main" val="1"/>
+              <a14:shadowObscured xmlns:a14="http://schemas.microsoft.com/office/drawing/2010/main" xmlns="" val="1"/>
             </a:ext>
           </a:extLst>
         </p:spPr>
@@ -687,14 +688,14 @@
           <a:effectLst/>
           <a:extLst>
             <a:ext uri="{909E8E84-426E-40dd-AFC4-6F175D3DCCD1}">
-              <a14:hiddenFill xmlns="" xmlns:a14="http://schemas.microsoft.com/office/drawing/2010/main">
+              <a14:hiddenFill xmlns:a14="http://schemas.microsoft.com/office/drawing/2010/main" xmlns="">
                 <a:solidFill>
                   <a:schemeClr val="accent1"/>
                 </a:solidFill>
               </a14:hiddenFill>
             </a:ext>
             <a:ext uri="{91240B29-F687-4f45-9708-019B960494DF}">
-              <a14:hiddenLine xmlns="" xmlns:a14="http://schemas.microsoft.com/office/drawing/2010/main" w="9525">
+              <a14:hiddenLine xmlns:a14="http://schemas.microsoft.com/office/drawing/2010/main" xmlns="" w="9525">
                 <a:solidFill>
                   <a:schemeClr val="tx1"/>
                 </a:solidFill>
@@ -704,7 +705,7 @@
               </a14:hiddenLine>
             </a:ext>
             <a:ext uri="{AF507438-7753-43e0-B8FC-AC1667EBCBE1}">
-              <a14:hiddenEffects xmlns="" xmlns:a14="http://schemas.microsoft.com/office/drawing/2010/main">
+              <a14:hiddenEffects xmlns:a14="http://schemas.microsoft.com/office/drawing/2010/main" xmlns="">
                 <a:effectLst>
                   <a:outerShdw blurRad="63500" dist="38099" dir="2700000" algn="ctr" rotWithShape="0">
                     <a:schemeClr val="bg2">
@@ -715,7 +716,7 @@
               </a14:hiddenEffects>
             </a:ext>
             <a:ext uri="{FAA26D3D-D897-4be2-8F04-BA451C77F1D7}">
-              <ma14:placeholderFlag xmlns="" xmlns:ma14="http://schemas.microsoft.com/office/mac/drawingml/2011/main" val="1"/>
+              <ma14:placeholderFlag xmlns:ma14="http://schemas.microsoft.com/office/mac/drawingml/2011/main" xmlns="" val="1"/>
             </a:ext>
           </a:extLst>
         </p:spPr>
@@ -2926,14 +2927,14 @@
           <a:effectLst/>
           <a:extLst>
             <a:ext uri="{909E8E84-426E-40dd-AFC4-6F175D3DCCD1}">
-              <a14:hiddenFill xmlns="" xmlns:a14="http://schemas.microsoft.com/office/drawing/2010/main">
+              <a14:hiddenFill xmlns:a14="http://schemas.microsoft.com/office/drawing/2010/main" xmlns="">
                 <a:solidFill>
                   <a:schemeClr val="accent2"/>
                 </a:solidFill>
               </a14:hiddenFill>
             </a:ext>
             <a:ext uri="{AF507438-7753-43e0-B8FC-AC1667EBCBE1}">
-              <a14:hiddenEffects xmlns="" xmlns:a14="http://schemas.microsoft.com/office/drawing/2010/main">
+              <a14:hiddenEffects xmlns:a14="http://schemas.microsoft.com/office/drawing/2010/main" xmlns="">
                 <a:effectLst>
                   <a:outerShdw blurRad="63500" dist="35921" dir="2700000" algn="ctr" rotWithShape="0">
                     <a:schemeClr val="bg2"/>
@@ -3447,14 +3448,14 @@
           <a:effectLst/>
           <a:extLst>
             <a:ext uri="{909E8E84-426E-40dd-AFC4-6F175D3DCCD1}">
-              <a14:hiddenFill xmlns="" xmlns:a14="http://schemas.microsoft.com/office/drawing/2010/main">
+              <a14:hiddenFill xmlns:a14="http://schemas.microsoft.com/office/drawing/2010/main" xmlns="">
                 <a:solidFill>
                   <a:schemeClr val="accent2"/>
                 </a:solidFill>
               </a14:hiddenFill>
             </a:ext>
             <a:ext uri="{AF507438-7753-43e0-B8FC-AC1667EBCBE1}">
-              <a14:hiddenEffects xmlns="" xmlns:a14="http://schemas.microsoft.com/office/drawing/2010/main">
+              <a14:hiddenEffects xmlns:a14="http://schemas.microsoft.com/office/drawing/2010/main" xmlns="">
                 <a:effectLst>
                   <a:outerShdw blurRad="63500" dist="35921" dir="2700000" algn="ctr" rotWithShape="0">
                     <a:schemeClr val="bg2"/>
@@ -3636,7 +3637,7 @@
           <a:noFill/>
           <a:extLst>
             <a:ext uri="{909E8E84-426E-40dd-AFC4-6F175D3DCCD1}">
-              <a14:hiddenFill xmlns="" xmlns:a14="http://schemas.microsoft.com/office/drawing/2010/main">
+              <a14:hiddenFill xmlns:a14="http://schemas.microsoft.com/office/drawing/2010/main" xmlns="">
                 <a:solidFill>
                   <a:srgbClr val="FFFFFF"/>
                 </a:solidFill>
@@ -3677,7 +3678,7 @@
           <a:noFill/>
           <a:extLst>
             <a:ext uri="{909E8E84-426E-40dd-AFC4-6F175D3DCCD1}">
-              <a14:hiddenFill xmlns="" xmlns:a14="http://schemas.microsoft.com/office/drawing/2010/main">
+              <a14:hiddenFill xmlns:a14="http://schemas.microsoft.com/office/drawing/2010/main" xmlns="">
                 <a:solidFill>
                   <a:srgbClr val="FFFFFF"/>
                 </a:solidFill>
@@ -3706,14 +3707,14 @@
           </a:prstGeom>
           <a:extLst>
             <a:ext uri="{909E8E84-426E-40dd-AFC4-6F175D3DCCD1}">
-              <a14:hiddenFill xmlns="" xmlns:a14="http://schemas.microsoft.com/office/drawing/2010/main">
+              <a14:hiddenFill xmlns:a14="http://schemas.microsoft.com/office/drawing/2010/main" xmlns="">
                 <a:solidFill>
                   <a:schemeClr val="accent2"/>
                 </a:solidFill>
               </a14:hiddenFill>
             </a:ext>
             <a:ext uri="{91240B29-F687-4f45-9708-019B960494DF}">
-              <a14:hiddenLine xmlns="" xmlns:a14="http://schemas.microsoft.com/office/drawing/2010/main" w="9525">
+              <a14:hiddenLine xmlns:a14="http://schemas.microsoft.com/office/drawing/2010/main" xmlns="" w="9525">
                 <a:solidFill>
                   <a:schemeClr val="accent2"/>
                 </a:solidFill>
@@ -4112,7 +4113,7 @@
           <a:noFill/>
           <a:extLst>
             <a:ext uri="{909E8E84-426E-40dd-AFC4-6F175D3DCCD1}">
-              <a14:hiddenFill xmlns="" xmlns:a14="http://schemas.microsoft.com/office/drawing/2010/main">
+              <a14:hiddenFill xmlns:a14="http://schemas.microsoft.com/office/drawing/2010/main" xmlns="">
                 <a:solidFill>
                   <a:srgbClr val="FFFFFF"/>
                 </a:solidFill>
@@ -4307,14 +4308,14 @@
           <a:effectLst/>
           <a:extLst>
             <a:ext uri="{909E8E84-426E-40dd-AFC4-6F175D3DCCD1}">
-              <a14:hiddenFill xmlns="" xmlns:a14="http://schemas.microsoft.com/office/drawing/2010/main">
+              <a14:hiddenFill xmlns:a14="http://schemas.microsoft.com/office/drawing/2010/main" xmlns="">
                 <a:solidFill>
                   <a:schemeClr val="accent2"/>
                 </a:solidFill>
               </a14:hiddenFill>
             </a:ext>
             <a:ext uri="{AF507438-7753-43e0-B8FC-AC1667EBCBE1}">
-              <a14:hiddenEffects xmlns="" xmlns:a14="http://schemas.microsoft.com/office/drawing/2010/main">
+              <a14:hiddenEffects xmlns:a14="http://schemas.microsoft.com/office/drawing/2010/main" xmlns="">
                 <a:effectLst>
                   <a:outerShdw blurRad="63500" dist="35921" dir="2700000" algn="ctr" rotWithShape="0">
                     <a:schemeClr val="bg2"/>
@@ -4396,7 +4397,7 @@
           <a:noFill/>
           <a:extLst>
             <a:ext uri="{909E8E84-426E-40dd-AFC4-6F175D3DCCD1}">
-              <a14:hiddenFill xmlns="" xmlns:a14="http://schemas.microsoft.com/office/drawing/2010/main">
+              <a14:hiddenFill xmlns:a14="http://schemas.microsoft.com/office/drawing/2010/main" xmlns="">
                 <a:solidFill>
                   <a:srgbClr val="FFFFFF"/>
                 </a:solidFill>
@@ -4428,14 +4429,14 @@
           <a:effectLst/>
           <a:extLst>
             <a:ext uri="{909E8E84-426E-40dd-AFC4-6F175D3DCCD1}">
-              <a14:hiddenFill xmlns="" xmlns:a14="http://schemas.microsoft.com/office/drawing/2010/main">
+              <a14:hiddenFill xmlns:a14="http://schemas.microsoft.com/office/drawing/2010/main" xmlns="">
                 <a:solidFill>
                   <a:schemeClr val="accent1"/>
                 </a:solidFill>
               </a14:hiddenFill>
             </a:ext>
             <a:ext uri="{91240B29-F687-4f45-9708-019B960494DF}">
-              <a14:hiddenLine xmlns="" xmlns:a14="http://schemas.microsoft.com/office/drawing/2010/main" w="9525">
+              <a14:hiddenLine xmlns:a14="http://schemas.microsoft.com/office/drawing/2010/main" xmlns="" w="9525">
                 <a:solidFill>
                   <a:schemeClr val="tx1"/>
                 </a:solidFill>
@@ -4445,7 +4446,7 @@
               </a14:hiddenLine>
             </a:ext>
             <a:ext uri="{AF507438-7753-43e0-B8FC-AC1667EBCBE1}">
-              <a14:hiddenEffects xmlns="" xmlns:a14="http://schemas.microsoft.com/office/drawing/2010/main">
+              <a14:hiddenEffects xmlns:a14="http://schemas.microsoft.com/office/drawing/2010/main" xmlns="">
                 <a:effectLst>
                   <a:outerShdw blurRad="63500" dist="38099" dir="2700000" algn="ctr" rotWithShape="0">
                     <a:schemeClr val="bg2">
@@ -4502,7 +4503,7 @@
                   <a:spcPts val="0"/>
                 </a:spcBef>
               </a:pPr>
-              <a:t>‹Nr.›</a:t>
+              <a:t>‹#›</a:t>
             </a:fld>
             <a:r>
               <a:rPr lang="de-DE" sz="800" dirty="0">
@@ -4547,7 +4548,7 @@
           <a:noFill/>
           <a:extLst>
             <a:ext uri="{909E8E84-426E-40dd-AFC4-6F175D3DCCD1}">
-              <a14:hiddenFill xmlns="" xmlns:a14="http://schemas.microsoft.com/office/drawing/2010/main">
+              <a14:hiddenFill xmlns:a14="http://schemas.microsoft.com/office/drawing/2010/main" xmlns="">
                 <a:solidFill>
                   <a:srgbClr val="FFFFFF"/>
                 </a:solidFill>
@@ -4588,7 +4589,7 @@
           <a:noFill/>
           <a:extLst>
             <a:ext uri="{909E8E84-426E-40dd-AFC4-6F175D3DCCD1}">
-              <a14:hiddenFill xmlns="" xmlns:a14="http://schemas.microsoft.com/office/drawing/2010/main">
+              <a14:hiddenFill xmlns:a14="http://schemas.microsoft.com/office/drawing/2010/main" xmlns="">
                 <a:solidFill>
                   <a:srgbClr val="FFFFFF"/>
                 </a:solidFill>
@@ -4626,14 +4627,14 @@
           <a:effectLst/>
           <a:extLst>
             <a:ext uri="{909E8E84-426E-40dd-AFC4-6F175D3DCCD1}">
-              <a14:hiddenFill xmlns="" xmlns:a14="http://schemas.microsoft.com/office/drawing/2010/main">
+              <a14:hiddenFill xmlns:a14="http://schemas.microsoft.com/office/drawing/2010/main" xmlns="">
                 <a:solidFill>
                   <a:schemeClr val="accent1"/>
                 </a:solidFill>
               </a14:hiddenFill>
             </a:ext>
             <a:ext uri="{91240B29-F687-4f45-9708-019B960494DF}">
-              <a14:hiddenLine xmlns="" xmlns:a14="http://schemas.microsoft.com/office/drawing/2010/main" w="9525">
+              <a14:hiddenLine xmlns:a14="http://schemas.microsoft.com/office/drawing/2010/main" xmlns="" w="9525">
                 <a:solidFill>
                   <a:schemeClr val="tx1"/>
                 </a:solidFill>
@@ -4643,7 +4644,7 @@
               </a14:hiddenLine>
             </a:ext>
             <a:ext uri="{AF507438-7753-43e0-B8FC-AC1667EBCBE1}">
-              <a14:hiddenEffects xmlns="" xmlns:a14="http://schemas.microsoft.com/office/drawing/2010/main">
+              <a14:hiddenEffects xmlns:a14="http://schemas.microsoft.com/office/drawing/2010/main" xmlns="">
                 <a:effectLst>
                   <a:outerShdw blurRad="63500" dist="38099" dir="2700000" algn="ctr" rotWithShape="0">
                     <a:schemeClr val="bg2">
@@ -5367,14 +5368,14 @@
           <a:effectLst/>
           <a:extLst>
             <a:ext uri="{909E8E84-426E-40dd-AFC4-6F175D3DCCD1}">
-              <a14:hiddenFill xmlns="" xmlns:a14="http://schemas.microsoft.com/office/drawing/2010/main">
+              <a14:hiddenFill xmlns:a14="http://schemas.microsoft.com/office/drawing/2010/main" xmlns="">
                 <a:solidFill>
                   <a:schemeClr val="accent2"/>
                 </a:solidFill>
               </a14:hiddenFill>
             </a:ext>
             <a:ext uri="{AF507438-7753-43e0-B8FC-AC1667EBCBE1}">
-              <a14:hiddenEffects xmlns="" xmlns:a14="http://schemas.microsoft.com/office/drawing/2010/main">
+              <a14:hiddenEffects xmlns:a14="http://schemas.microsoft.com/office/drawing/2010/main" xmlns="">
                 <a:effectLst>
                   <a:outerShdw blurRad="63500" dist="35921" dir="2700000" algn="ctr" rotWithShape="0">
                     <a:schemeClr val="bg2"/>
@@ -5509,6 +5510,202 @@
 </file>
 
 <file path=ppt/slides/slide3.xml><?xml version="1.0" encoding="utf-8"?>
+<p:sld xmlns:a="http://schemas.openxmlformats.org/drawingml/2006/main" xmlns:r="http://schemas.openxmlformats.org/officeDocument/2006/relationships" xmlns:p="http://schemas.openxmlformats.org/presentationml/2006/main">
+  <p:cSld>
+    <p:spTree>
+      <p:nvGrpSpPr>
+        <p:cNvPr id="1" name=""/>
+        <p:cNvGrpSpPr/>
+        <p:nvPr/>
+      </p:nvGrpSpPr>
+      <p:grpSpPr>
+        <a:xfrm>
+          <a:off x="0" y="0"/>
+          <a:ext cx="0" cy="0"/>
+          <a:chOff x="0" y="0"/>
+          <a:chExt cx="0" cy="0"/>
+        </a:xfrm>
+      </p:grpSpPr>
+      <p:sp>
+        <p:nvSpPr>
+          <p:cNvPr id="19" name="Title 1">
+            <a:extLst>
+              <a:ext uri="{FF2B5EF4-FFF2-40B4-BE49-F238E27FC236}">
+                <a16:creationId xmlns:a16="http://schemas.microsoft.com/office/drawing/2014/main" id="{99712D78-C5E0-7D8E-27E0-B588E3E7E78B}"/>
+              </a:ext>
+            </a:extLst>
+          </p:cNvPr>
+          <p:cNvSpPr>
+            <a:spLocks noGrp="1"/>
+          </p:cNvSpPr>
+          <p:nvPr>
+            <p:ph type="title"/>
+          </p:nvPr>
+        </p:nvSpPr>
+        <p:spPr>
+          <a:xfrm>
+            <a:off x="573088" y="184706"/>
+            <a:ext cx="8063999" cy="369332"/>
+          </a:xfrm>
+        </p:spPr>
+        <p:txBody>
+          <a:bodyPr/>
+          <a:lstStyle/>
+          <a:p>
+            <a:r>
+              <a:rPr lang="de-DE" dirty="0"/>
+              <a:t>Kappa Architecture</a:t>
+            </a:r>
+            <a:endParaRPr lang="en-US" dirty="0"/>
+          </a:p>
+        </p:txBody>
+      </p:sp>
+      <p:pic>
+        <p:nvPicPr>
+          <p:cNvPr id="6" name="Picture 5">
+            <a:extLst>
+              <a:ext uri="{FF2B5EF4-FFF2-40B4-BE49-F238E27FC236}">
+                <a16:creationId xmlns:a16="http://schemas.microsoft.com/office/drawing/2014/main" id="{85D33197-79E1-8A2D-C3F0-FD430709DA25}"/>
+              </a:ext>
+            </a:extLst>
+          </p:cNvPr>
+          <p:cNvPicPr>
+            <a:picLocks/>
+          </p:cNvPicPr>
+          <p:nvPr/>
+        </p:nvPicPr>
+        <p:blipFill>
+          <a:blip r:embed="rId2"/>
+          <a:stretch>
+            <a:fillRect/>
+          </a:stretch>
+        </p:blipFill>
+        <p:spPr>
+          <a:xfrm>
+            <a:off x="573088" y="1742837"/>
+            <a:ext cx="8064499" cy="3749991"/>
+          </a:xfrm>
+          <a:prstGeom prst="rect">
+            <a:avLst/>
+          </a:prstGeom>
+          <a:noFill/>
+        </p:spPr>
+      </p:pic>
+      <p:sp>
+        <p:nvSpPr>
+          <p:cNvPr id="21" name="Content Placeholder 3">
+            <a:extLst>
+              <a:ext uri="{FF2B5EF4-FFF2-40B4-BE49-F238E27FC236}">
+                <a16:creationId xmlns:a16="http://schemas.microsoft.com/office/drawing/2014/main" id="{995106A9-44B5-0237-6AC8-16D7D44CA91B}"/>
+              </a:ext>
+            </a:extLst>
+          </p:cNvPr>
+          <p:cNvSpPr>
+            <a:spLocks noGrp="1"/>
+          </p:cNvSpPr>
+          <p:nvPr>
+            <p:ph sz="quarter" idx="10"/>
+          </p:nvPr>
+        </p:nvSpPr>
+        <p:spPr>
+          <a:xfrm>
+            <a:off x="1286541" y="5818708"/>
+            <a:ext cx="7350546" cy="292162"/>
+          </a:xfrm>
+        </p:spPr>
+        <p:txBody>
+          <a:bodyPr/>
+          <a:lstStyle/>
+          <a:p>
+            <a:r>
+              <a:rPr lang="en-US" dirty="0"/>
+              <a:t>Feick, Martin, Niko </a:t>
+            </a:r>
+            <a:r>
+              <a:rPr lang="en-US" dirty="0" err="1"/>
+              <a:t>Kleer</a:t>
+            </a:r>
+            <a:r>
+              <a:rPr lang="en-US" dirty="0"/>
+              <a:t>, and Marek Kohn. "Fundamentals of real-time data processing architectures lambda and kappa.“</a:t>
+            </a:r>
+            <a:br>
+              <a:rPr lang="en-US" dirty="0"/>
+            </a:br>
+            <a:r>
+              <a:rPr lang="en-US" dirty="0" err="1"/>
+              <a:t>Owczarek</a:t>
+            </a:r>
+            <a:r>
+              <a:rPr lang="en-US" dirty="0"/>
+              <a:t>. “Lambda vs. Kappa Architecture.” URL: https://nexocode.com/blog/posts/lambda-vs-kappa-architecture/</a:t>
+            </a:r>
+          </a:p>
+        </p:txBody>
+      </p:sp>
+      <p:sp>
+        <p:nvSpPr>
+          <p:cNvPr id="23" name="Text Placeholder 4">
+            <a:extLst>
+              <a:ext uri="{FF2B5EF4-FFF2-40B4-BE49-F238E27FC236}">
+                <a16:creationId xmlns:a16="http://schemas.microsoft.com/office/drawing/2014/main" id="{31643580-18A5-4F84-8C6E-10C423A06E50}"/>
+              </a:ext>
+            </a:extLst>
+          </p:cNvPr>
+          <p:cNvSpPr>
+            <a:spLocks noGrp="1"/>
+          </p:cNvSpPr>
+          <p:nvPr>
+            <p:ph type="body" sz="quarter" idx="12"/>
+          </p:nvPr>
+        </p:nvSpPr>
+        <p:spPr>
+          <a:xfrm>
+            <a:off x="573088" y="581897"/>
+            <a:ext cx="8063999" cy="274637"/>
+          </a:xfrm>
+        </p:spPr>
+        <p:txBody>
+          <a:bodyPr/>
+          <a:lstStyle/>
+          <a:p>
+            <a:r>
+              <a:rPr lang="de-DE" dirty="0" err="1"/>
+              <a:t>Everything</a:t>
+            </a:r>
+            <a:r>
+              <a:rPr lang="de-DE" dirty="0"/>
+              <a:t> </a:t>
+            </a:r>
+            <a:r>
+              <a:rPr lang="de-DE" dirty="0" err="1"/>
+              <a:t>is</a:t>
+            </a:r>
+            <a:r>
+              <a:rPr lang="de-DE" dirty="0"/>
+              <a:t> a stream!</a:t>
+            </a:r>
+            <a:endParaRPr lang="en-US" dirty="0"/>
+          </a:p>
+        </p:txBody>
+      </p:sp>
+    </p:spTree>
+    <p:extLst>
+      <p:ext uri="{BB962C8B-B14F-4D97-AF65-F5344CB8AC3E}">
+        <p14:creationId xmlns:p14="http://schemas.microsoft.com/office/powerpoint/2010/main" val="300996954"/>
+      </p:ext>
+    </p:extLst>
+  </p:cSld>
+  <p:clrMapOvr>
+    <a:masterClrMapping/>
+  </p:clrMapOvr>
+  <p:transition>
+    <p:dissolve/>
+  </p:transition>
+</p:sld>
+</file>
+
+<file path=ppt/slides/slide4.xml><?xml version="1.0" encoding="utf-8"?>
 <p:sld xmlns:a="http://schemas.openxmlformats.org/drawingml/2006/main" xmlns:r="http://schemas.openxmlformats.org/officeDocument/2006/relationships" xmlns:p="http://schemas.openxmlformats.org/presentationml/2006/main">
   <p:cSld>
     <p:spTree>
@@ -5941,14 +6138,14 @@
         <a:effectLst/>
         <a:extLst>
           <a:ext uri="{909E8E84-426E-40dd-AFC4-6F175D3DCCD1}">
-            <a14:hiddenFill xmlns="" xmlns:a14="http://schemas.microsoft.com/office/drawing/2010/main">
+            <a14:hiddenFill xmlns:a14="http://schemas.microsoft.com/office/drawing/2010/main" xmlns="">
               <a:solidFill>
                 <a:schemeClr val="accent2"/>
               </a:solidFill>
             </a14:hiddenFill>
           </a:ext>
           <a:ext uri="{AF507438-7753-43e0-B8FC-AC1667EBCBE1}">
-            <a14:hiddenEffects xmlns="" xmlns:a14="http://schemas.microsoft.com/office/drawing/2010/main">
+            <a14:hiddenEffects xmlns:a14="http://schemas.microsoft.com/office/drawing/2010/main" xmlns="">
               <a:effectLst>
                 <a:outerShdw blurRad="63500" dist="35921" dir="2700000" algn="ctr" rotWithShape="0">
                   <a:schemeClr val="bg2"/>
@@ -6021,14 +6218,14 @@
         <a:effectLst/>
         <a:extLst>
           <a:ext uri="{909E8E84-426E-40dd-AFC4-6F175D3DCCD1}">
-            <a14:hiddenFill xmlns="" xmlns:a14="http://schemas.microsoft.com/office/drawing/2010/main">
+            <a14:hiddenFill xmlns:a14="http://schemas.microsoft.com/office/drawing/2010/main" xmlns="">
               <a:solidFill>
                 <a:schemeClr val="accent2"/>
               </a:solidFill>
             </a14:hiddenFill>
           </a:ext>
           <a:ext uri="{AF507438-7753-43e0-B8FC-AC1667EBCBE1}">
-            <a14:hiddenEffects xmlns="" xmlns:a14="http://schemas.microsoft.com/office/drawing/2010/main">
+            <a14:hiddenEffects xmlns:a14="http://schemas.microsoft.com/office/drawing/2010/main" xmlns="">
               <a:effectLst>
                 <a:outerShdw blurRad="63500" dist="35921" dir="2700000" algn="ctr" rotWithShape="0">
                   <a:schemeClr val="bg2"/>
@@ -6800,4 +6997,24 @@
   </a:objectDefaults>
   <a:extraClrSchemeLst/>
 </a:theme>
+</file>
+
+<file path=ppt/webextensions/taskpanes.xml><?xml version="1.0" encoding="utf-8"?>
+<wetp:taskpanes xmlns:wetp="http://schemas.microsoft.com/office/webextensions/taskpanes/2010/11">
+  <wetp:taskpane dockstate="right" visibility="0" width="350" row="1">
+    <wetp:webextensionref xmlns:r="http://schemas.openxmlformats.org/officeDocument/2006/relationships" r:id="rId1"/>
+  </wetp:taskpane>
+</wetp:taskpanes>
+</file>
+
+<file path=ppt/webextensions/webextension1.xml><?xml version="1.0" encoding="utf-8"?>
+<we:webextension xmlns:we="http://schemas.microsoft.com/office/webextensions/webextension/2010/11" id="{125F4E23-4BA2-4D5B-9D0A-C360A682EFF5}">
+  <we:reference id="wa200000113" version="1.0.0.0" store="en-US" storeType="OMEX"/>
+  <we:alternateReferences>
+    <we:reference id="wa200000113" version="1.0.0.0" store="en-US" storeType="OMEX"/>
+  </we:alternateReferences>
+  <we:properties/>
+  <we:bindings/>
+  <we:snapshot xmlns:r="http://schemas.openxmlformats.org/officeDocument/2006/relationships"/>
+</we:webextension>
 </file>
</xml_diff>

<commit_message>
add wip of the project 7.2.2023
</commit_message>
<xml_diff>
--- a/content/presentation/Presentation-Stream-Processing.pptx
+++ b/content/presentation/Presentation-Stream-Processing.pptx
@@ -5,16 +5,18 @@
     <p:sldMasterId id="2147483648" r:id="rId1"/>
   </p:sldMasterIdLst>
   <p:notesMasterIdLst>
-    <p:notesMasterId r:id="rId6"/>
+    <p:notesMasterId r:id="rId8"/>
   </p:notesMasterIdLst>
   <p:handoutMasterIdLst>
-    <p:handoutMasterId r:id="rId7"/>
+    <p:handoutMasterId r:id="rId9"/>
   </p:handoutMasterIdLst>
   <p:sldIdLst>
     <p:sldId id="1944" r:id="rId2"/>
-    <p:sldId id="1943" r:id="rId3"/>
-    <p:sldId id="1946" r:id="rId4"/>
-    <p:sldId id="1945" r:id="rId5"/>
+    <p:sldId id="1946" r:id="rId3"/>
+    <p:sldId id="1949" r:id="rId4"/>
+    <p:sldId id="1950" r:id="rId5"/>
+    <p:sldId id="1948" r:id="rId6"/>
+    <p:sldId id="1945" r:id="rId7"/>
   </p:sldIdLst>
   <p:sldSz cx="9144000" cy="6858000" type="screen4x3"/>
   <p:notesSz cx="6858000" cy="9661525"/>
@@ -24,7 +26,7 @@
     </p:custShow>
   </p:custShowLst>
   <p:custDataLst>
-    <p:tags r:id="rId8"/>
+    <p:tags r:id="rId10"/>
   </p:custDataLst>
   <p:defaultTextStyle>
     <a:defPPr>
@@ -289,14 +291,14 @@
           <a:effectLst/>
           <a:extLst>
             <a:ext uri="{909E8E84-426E-40dd-AFC4-6F175D3DCCD1}">
-              <a14:hiddenFill xmlns:a14="http://schemas.microsoft.com/office/drawing/2010/main" xmlns="">
+              <a14:hiddenFill xmlns="" xmlns:a14="http://schemas.microsoft.com/office/drawing/2010/main">
                 <a:solidFill>
                   <a:schemeClr val="accent1"/>
                 </a:solidFill>
               </a14:hiddenFill>
             </a:ext>
             <a:ext uri="{91240B29-F687-4f45-9708-019B960494DF}">
-              <a14:hiddenLine xmlns:a14="http://schemas.microsoft.com/office/drawing/2010/main" xmlns="" w="9525">
+              <a14:hiddenLine xmlns="" xmlns:a14="http://schemas.microsoft.com/office/drawing/2010/main" w="9525">
                 <a:solidFill>
                   <a:schemeClr val="tx1"/>
                 </a:solidFill>
@@ -306,7 +308,7 @@
               </a14:hiddenLine>
             </a:ext>
             <a:ext uri="{AF507438-7753-43e0-B8FC-AC1667EBCBE1}">
-              <a14:hiddenEffects xmlns:a14="http://schemas.microsoft.com/office/drawing/2010/main" xmlns="">
+              <a14:hiddenEffects xmlns="" xmlns:a14="http://schemas.microsoft.com/office/drawing/2010/main">
                 <a:effectLst>
                   <a:outerShdw blurRad="63500" dist="38099" dir="2700000" algn="ctr" rotWithShape="0">
                     <a:schemeClr val="bg2">
@@ -317,7 +319,7 @@
               </a14:hiddenEffects>
             </a:ext>
             <a:ext uri="{FAA26D3D-D897-4be2-8F04-BA451C77F1D7}">
-              <ma14:placeholderFlag xmlns:ma14="http://schemas.microsoft.com/office/mac/drawingml/2011/main" xmlns="" val="1"/>
+              <ma14:placeholderFlag xmlns="" xmlns:ma14="http://schemas.microsoft.com/office/mac/drawingml/2011/main" val="1"/>
             </a:ext>
           </a:extLst>
         </p:spPr>
@@ -367,14 +369,14 @@
           <a:effectLst/>
           <a:extLst>
             <a:ext uri="{909E8E84-426E-40dd-AFC4-6F175D3DCCD1}">
-              <a14:hiddenFill xmlns:a14="http://schemas.microsoft.com/office/drawing/2010/main" xmlns="">
+              <a14:hiddenFill xmlns="" xmlns:a14="http://schemas.microsoft.com/office/drawing/2010/main">
                 <a:solidFill>
                   <a:schemeClr val="accent1"/>
                 </a:solidFill>
               </a14:hiddenFill>
             </a:ext>
             <a:ext uri="{91240B29-F687-4f45-9708-019B960494DF}">
-              <a14:hiddenLine xmlns:a14="http://schemas.microsoft.com/office/drawing/2010/main" xmlns="" w="9525">
+              <a14:hiddenLine xmlns="" xmlns:a14="http://schemas.microsoft.com/office/drawing/2010/main" w="9525">
                 <a:solidFill>
                   <a:schemeClr val="tx1"/>
                 </a:solidFill>
@@ -384,7 +386,7 @@
               </a14:hiddenLine>
             </a:ext>
             <a:ext uri="{AF507438-7753-43e0-B8FC-AC1667EBCBE1}">
-              <a14:hiddenEffects xmlns:a14="http://schemas.microsoft.com/office/drawing/2010/main" xmlns="">
+              <a14:hiddenEffects xmlns="" xmlns:a14="http://schemas.microsoft.com/office/drawing/2010/main">
                 <a:effectLst>
                   <a:outerShdw blurRad="63500" dist="38099" dir="2700000" algn="ctr" rotWithShape="0">
                     <a:schemeClr val="bg2">
@@ -395,7 +397,7 @@
               </a14:hiddenEffects>
             </a:ext>
             <a:ext uri="{FAA26D3D-D897-4be2-8F04-BA451C77F1D7}">
-              <ma14:placeholderFlag xmlns:ma14="http://schemas.microsoft.com/office/mac/drawingml/2011/main" xmlns="" val="1"/>
+              <ma14:placeholderFlag xmlns="" xmlns:ma14="http://schemas.microsoft.com/office/mac/drawingml/2011/main" val="1"/>
             </a:ext>
           </a:extLst>
         </p:spPr>
@@ -445,14 +447,14 @@
           <a:effectLst/>
           <a:extLst>
             <a:ext uri="{909E8E84-426E-40dd-AFC4-6F175D3DCCD1}">
-              <a14:hiddenFill xmlns:a14="http://schemas.microsoft.com/office/drawing/2010/main" xmlns="">
+              <a14:hiddenFill xmlns="" xmlns:a14="http://schemas.microsoft.com/office/drawing/2010/main">
                 <a:solidFill>
                   <a:schemeClr val="accent1"/>
                 </a:solidFill>
               </a14:hiddenFill>
             </a:ext>
             <a:ext uri="{91240B29-F687-4f45-9708-019B960494DF}">
-              <a14:hiddenLine xmlns:a14="http://schemas.microsoft.com/office/drawing/2010/main" xmlns="" w="9525">
+              <a14:hiddenLine xmlns="" xmlns:a14="http://schemas.microsoft.com/office/drawing/2010/main" w="9525">
                 <a:solidFill>
                   <a:schemeClr val="tx1"/>
                 </a:solidFill>
@@ -462,7 +464,7 @@
               </a14:hiddenLine>
             </a:ext>
             <a:ext uri="{AF507438-7753-43e0-B8FC-AC1667EBCBE1}">
-              <a14:hiddenEffects xmlns:a14="http://schemas.microsoft.com/office/drawing/2010/main" xmlns="">
+              <a14:hiddenEffects xmlns="" xmlns:a14="http://schemas.microsoft.com/office/drawing/2010/main">
                 <a:effectLst>
                   <a:outerShdw blurRad="63500" dist="38099" dir="2700000" algn="ctr" rotWithShape="0">
                     <a:schemeClr val="bg2">
@@ -473,7 +475,7 @@
               </a14:hiddenEffects>
             </a:ext>
             <a:ext uri="{FAA26D3D-D897-4be2-8F04-BA451C77F1D7}">
-              <ma14:placeholderFlag xmlns:ma14="http://schemas.microsoft.com/office/mac/drawingml/2011/main" xmlns="" val="1"/>
+              <ma14:placeholderFlag xmlns="" xmlns:ma14="http://schemas.microsoft.com/office/mac/drawingml/2011/main" val="1"/>
             </a:ext>
           </a:extLst>
         </p:spPr>
@@ -523,14 +525,14 @@
           <a:effectLst/>
           <a:extLst>
             <a:ext uri="{909E8E84-426E-40dd-AFC4-6F175D3DCCD1}">
-              <a14:hiddenFill xmlns:a14="http://schemas.microsoft.com/office/drawing/2010/main" xmlns="">
+              <a14:hiddenFill xmlns="" xmlns:a14="http://schemas.microsoft.com/office/drawing/2010/main">
                 <a:solidFill>
                   <a:schemeClr val="accent1"/>
                 </a:solidFill>
               </a14:hiddenFill>
             </a:ext>
             <a:ext uri="{91240B29-F687-4f45-9708-019B960494DF}">
-              <a14:hiddenLine xmlns:a14="http://schemas.microsoft.com/office/drawing/2010/main" xmlns="" w="9525">
+              <a14:hiddenLine xmlns="" xmlns:a14="http://schemas.microsoft.com/office/drawing/2010/main" w="9525">
                 <a:solidFill>
                   <a:schemeClr val="tx1"/>
                 </a:solidFill>
@@ -540,7 +542,7 @@
               </a14:hiddenLine>
             </a:ext>
             <a:ext uri="{AF507438-7753-43e0-B8FC-AC1667EBCBE1}">
-              <a14:hiddenEffects xmlns:a14="http://schemas.microsoft.com/office/drawing/2010/main" xmlns="">
+              <a14:hiddenEffects xmlns="" xmlns:a14="http://schemas.microsoft.com/office/drawing/2010/main">
                 <a:effectLst>
                   <a:outerShdw blurRad="63500" dist="38099" dir="2700000" algn="ctr" rotWithShape="0">
                     <a:schemeClr val="bg2">
@@ -551,7 +553,7 @@
               </a14:hiddenEffects>
             </a:ext>
             <a:ext uri="{FAA26D3D-D897-4be2-8F04-BA451C77F1D7}">
-              <ma14:placeholderFlag xmlns:ma14="http://schemas.microsoft.com/office/mac/drawingml/2011/main" xmlns="" val="1"/>
+              <ma14:placeholderFlag xmlns="" xmlns:ma14="http://schemas.microsoft.com/office/mac/drawingml/2011/main" val="1"/>
             </a:ext>
           </a:extLst>
         </p:spPr>
@@ -647,7 +649,7 @@
           <a:effectLst/>
           <a:extLst>
             <a:ext uri="{AF507438-7753-43e0-B8FC-AC1667EBCBE1}">
-              <a14:hiddenEffects xmlns:a14="http://schemas.microsoft.com/office/drawing/2010/main" xmlns="">
+              <a14:hiddenEffects xmlns="" xmlns:a14="http://schemas.microsoft.com/office/drawing/2010/main">
                 <a:effectLst>
                   <a:outerShdw blurRad="63500" dist="38099" dir="2700000" algn="ctr" rotWithShape="0">
                     <a:srgbClr val="000000">
@@ -658,7 +660,7 @@
               </a14:hiddenEffects>
             </a:ext>
             <a:ext uri="{53640926-AAD7-44d8-BBD7-CCE9431645EC}">
-              <a14:shadowObscured xmlns:a14="http://schemas.microsoft.com/office/drawing/2010/main" xmlns="" val="1"/>
+              <a14:shadowObscured xmlns="" xmlns:a14="http://schemas.microsoft.com/office/drawing/2010/main" val="1"/>
             </a:ext>
           </a:extLst>
         </p:spPr>
@@ -688,14 +690,14 @@
           <a:effectLst/>
           <a:extLst>
             <a:ext uri="{909E8E84-426E-40dd-AFC4-6F175D3DCCD1}">
-              <a14:hiddenFill xmlns:a14="http://schemas.microsoft.com/office/drawing/2010/main" xmlns="">
+              <a14:hiddenFill xmlns="" xmlns:a14="http://schemas.microsoft.com/office/drawing/2010/main">
                 <a:solidFill>
                   <a:schemeClr val="accent1"/>
                 </a:solidFill>
               </a14:hiddenFill>
             </a:ext>
             <a:ext uri="{91240B29-F687-4f45-9708-019B960494DF}">
-              <a14:hiddenLine xmlns:a14="http://schemas.microsoft.com/office/drawing/2010/main" xmlns="" w="9525">
+              <a14:hiddenLine xmlns="" xmlns:a14="http://schemas.microsoft.com/office/drawing/2010/main" w="9525">
                 <a:solidFill>
                   <a:schemeClr val="tx1"/>
                 </a:solidFill>
@@ -705,7 +707,7 @@
               </a14:hiddenLine>
             </a:ext>
             <a:ext uri="{AF507438-7753-43e0-B8FC-AC1667EBCBE1}">
-              <a14:hiddenEffects xmlns:a14="http://schemas.microsoft.com/office/drawing/2010/main" xmlns="">
+              <a14:hiddenEffects xmlns="" xmlns:a14="http://schemas.microsoft.com/office/drawing/2010/main">
                 <a:effectLst>
                   <a:outerShdw blurRad="63500" dist="38099" dir="2700000" algn="ctr" rotWithShape="0">
                     <a:schemeClr val="bg2">
@@ -716,7 +718,7 @@
               </a14:hiddenEffects>
             </a:ext>
             <a:ext uri="{FAA26D3D-D897-4be2-8F04-BA451C77F1D7}">
-              <ma14:placeholderFlag xmlns:ma14="http://schemas.microsoft.com/office/mac/drawingml/2011/main" xmlns="" val="1"/>
+              <ma14:placeholderFlag xmlns="" xmlns:ma14="http://schemas.microsoft.com/office/mac/drawingml/2011/main" val="1"/>
             </a:ext>
           </a:extLst>
         </p:spPr>
@@ -869,67 +871,6 @@
 </p:notesMaster>
 </file>
 
-<file path=ppt/notesSlides/notesSlide1.xml><?xml version="1.0" encoding="utf-8"?>
-<p:notes xmlns:a="http://schemas.openxmlformats.org/drawingml/2006/main" xmlns:r="http://schemas.openxmlformats.org/officeDocument/2006/relationships" xmlns:p="http://schemas.openxmlformats.org/presentationml/2006/main">
-  <p:cSld>
-    <p:spTree>
-      <p:nvGrpSpPr>
-        <p:cNvPr id="1" name=""/>
-        <p:cNvGrpSpPr/>
-        <p:nvPr/>
-      </p:nvGrpSpPr>
-      <p:grpSpPr>
-        <a:xfrm>
-          <a:off x="0" y="0"/>
-          <a:ext cx="0" cy="0"/>
-          <a:chOff x="0" y="0"/>
-          <a:chExt cx="0" cy="0"/>
-        </a:xfrm>
-      </p:grpSpPr>
-      <p:sp>
-        <p:nvSpPr>
-          <p:cNvPr id="2" name="Folienbildplatzhalter 1"/>
-          <p:cNvSpPr>
-            <a:spLocks noGrp="1" noRot="1" noChangeAspect="1"/>
-          </p:cNvSpPr>
-          <p:nvPr>
-            <p:ph type="sldImg"/>
-          </p:nvPr>
-        </p:nvSpPr>
-        <p:spPr/>
-      </p:sp>
-      <p:sp>
-        <p:nvSpPr>
-          <p:cNvPr id="3" name="Notizenplatzhalter 2"/>
-          <p:cNvSpPr>
-            <a:spLocks noGrp="1"/>
-          </p:cNvSpPr>
-          <p:nvPr>
-            <p:ph type="body" idx="1"/>
-          </p:nvPr>
-        </p:nvSpPr>
-        <p:spPr/>
-        <p:txBody>
-          <a:bodyPr/>
-          <a:lstStyle/>
-          <a:p>
-            <a:endParaRPr lang="en-GB" dirty="0"/>
-          </a:p>
-        </p:txBody>
-      </p:sp>
-    </p:spTree>
-    <p:extLst>
-      <p:ext uri="{BB962C8B-B14F-4D97-AF65-F5344CB8AC3E}">
-        <p14:creationId xmlns:p14="http://schemas.microsoft.com/office/powerpoint/2010/main" val="409897980"/>
-      </p:ext>
-    </p:extLst>
-  </p:cSld>
-  <p:clrMapOvr>
-    <a:masterClrMapping/>
-  </p:clrMapOvr>
-</p:notes>
-</file>
-
 <file path=ppt/slideLayouts/slideLayout1.xml><?xml version="1.0" encoding="utf-8"?>
 <p:sldLayout xmlns:a="http://schemas.openxmlformats.org/drawingml/2006/main" xmlns:r="http://schemas.openxmlformats.org/officeDocument/2006/relationships" xmlns:p="http://schemas.openxmlformats.org/presentationml/2006/main" preserve="1" userDrawn="1">
   <p:cSld name="Content + References">
@@ -2927,14 +2868,14 @@
           <a:effectLst/>
           <a:extLst>
             <a:ext uri="{909E8E84-426E-40dd-AFC4-6F175D3DCCD1}">
-              <a14:hiddenFill xmlns:a14="http://schemas.microsoft.com/office/drawing/2010/main" xmlns="">
+              <a14:hiddenFill xmlns="" xmlns:a14="http://schemas.microsoft.com/office/drawing/2010/main">
                 <a:solidFill>
                   <a:schemeClr val="accent2"/>
                 </a:solidFill>
               </a14:hiddenFill>
             </a:ext>
             <a:ext uri="{AF507438-7753-43e0-B8FC-AC1667EBCBE1}">
-              <a14:hiddenEffects xmlns:a14="http://schemas.microsoft.com/office/drawing/2010/main" xmlns="">
+              <a14:hiddenEffects xmlns="" xmlns:a14="http://schemas.microsoft.com/office/drawing/2010/main">
                 <a:effectLst>
                   <a:outerShdw blurRad="63500" dist="35921" dir="2700000" algn="ctr" rotWithShape="0">
                     <a:schemeClr val="bg2"/>
@@ -3448,14 +3389,14 @@
           <a:effectLst/>
           <a:extLst>
             <a:ext uri="{909E8E84-426E-40dd-AFC4-6F175D3DCCD1}">
-              <a14:hiddenFill xmlns:a14="http://schemas.microsoft.com/office/drawing/2010/main" xmlns="">
+              <a14:hiddenFill xmlns="" xmlns:a14="http://schemas.microsoft.com/office/drawing/2010/main">
                 <a:solidFill>
                   <a:schemeClr val="accent2"/>
                 </a:solidFill>
               </a14:hiddenFill>
             </a:ext>
             <a:ext uri="{AF507438-7753-43e0-B8FC-AC1667EBCBE1}">
-              <a14:hiddenEffects xmlns:a14="http://schemas.microsoft.com/office/drawing/2010/main" xmlns="">
+              <a14:hiddenEffects xmlns="" xmlns:a14="http://schemas.microsoft.com/office/drawing/2010/main">
                 <a:effectLst>
                   <a:outerShdw blurRad="63500" dist="35921" dir="2700000" algn="ctr" rotWithShape="0">
                     <a:schemeClr val="bg2"/>
@@ -3637,7 +3578,7 @@
           <a:noFill/>
           <a:extLst>
             <a:ext uri="{909E8E84-426E-40dd-AFC4-6F175D3DCCD1}">
-              <a14:hiddenFill xmlns:a14="http://schemas.microsoft.com/office/drawing/2010/main" xmlns="">
+              <a14:hiddenFill xmlns="" xmlns:a14="http://schemas.microsoft.com/office/drawing/2010/main">
                 <a:solidFill>
                   <a:srgbClr val="FFFFFF"/>
                 </a:solidFill>
@@ -3678,7 +3619,7 @@
           <a:noFill/>
           <a:extLst>
             <a:ext uri="{909E8E84-426E-40dd-AFC4-6F175D3DCCD1}">
-              <a14:hiddenFill xmlns:a14="http://schemas.microsoft.com/office/drawing/2010/main" xmlns="">
+              <a14:hiddenFill xmlns="" xmlns:a14="http://schemas.microsoft.com/office/drawing/2010/main">
                 <a:solidFill>
                   <a:srgbClr val="FFFFFF"/>
                 </a:solidFill>
@@ -3707,14 +3648,14 @@
           </a:prstGeom>
           <a:extLst>
             <a:ext uri="{909E8E84-426E-40dd-AFC4-6F175D3DCCD1}">
-              <a14:hiddenFill xmlns:a14="http://schemas.microsoft.com/office/drawing/2010/main" xmlns="">
+              <a14:hiddenFill xmlns="" xmlns:a14="http://schemas.microsoft.com/office/drawing/2010/main">
                 <a:solidFill>
                   <a:schemeClr val="accent2"/>
                 </a:solidFill>
               </a14:hiddenFill>
             </a:ext>
             <a:ext uri="{91240B29-F687-4f45-9708-019B960494DF}">
-              <a14:hiddenLine xmlns:a14="http://schemas.microsoft.com/office/drawing/2010/main" xmlns="" w="9525">
+              <a14:hiddenLine xmlns="" xmlns:a14="http://schemas.microsoft.com/office/drawing/2010/main" w="9525">
                 <a:solidFill>
                   <a:schemeClr val="accent2"/>
                 </a:solidFill>
@@ -4113,7 +4054,7 @@
           <a:noFill/>
           <a:extLst>
             <a:ext uri="{909E8E84-426E-40dd-AFC4-6F175D3DCCD1}">
-              <a14:hiddenFill xmlns:a14="http://schemas.microsoft.com/office/drawing/2010/main" xmlns="">
+              <a14:hiddenFill xmlns="" xmlns:a14="http://schemas.microsoft.com/office/drawing/2010/main">
                 <a:solidFill>
                   <a:srgbClr val="FFFFFF"/>
                 </a:solidFill>
@@ -4308,14 +4249,14 @@
           <a:effectLst/>
           <a:extLst>
             <a:ext uri="{909E8E84-426E-40dd-AFC4-6F175D3DCCD1}">
-              <a14:hiddenFill xmlns:a14="http://schemas.microsoft.com/office/drawing/2010/main" xmlns="">
+              <a14:hiddenFill xmlns="" xmlns:a14="http://schemas.microsoft.com/office/drawing/2010/main">
                 <a:solidFill>
                   <a:schemeClr val="accent2"/>
                 </a:solidFill>
               </a14:hiddenFill>
             </a:ext>
             <a:ext uri="{AF507438-7753-43e0-B8FC-AC1667EBCBE1}">
-              <a14:hiddenEffects xmlns:a14="http://schemas.microsoft.com/office/drawing/2010/main" xmlns="">
+              <a14:hiddenEffects xmlns="" xmlns:a14="http://schemas.microsoft.com/office/drawing/2010/main">
                 <a:effectLst>
                   <a:outerShdw blurRad="63500" dist="35921" dir="2700000" algn="ctr" rotWithShape="0">
                     <a:schemeClr val="bg2"/>
@@ -4397,7 +4338,7 @@
           <a:noFill/>
           <a:extLst>
             <a:ext uri="{909E8E84-426E-40dd-AFC4-6F175D3DCCD1}">
-              <a14:hiddenFill xmlns:a14="http://schemas.microsoft.com/office/drawing/2010/main" xmlns="">
+              <a14:hiddenFill xmlns="" xmlns:a14="http://schemas.microsoft.com/office/drawing/2010/main">
                 <a:solidFill>
                   <a:srgbClr val="FFFFFF"/>
                 </a:solidFill>
@@ -4429,14 +4370,14 @@
           <a:effectLst/>
           <a:extLst>
             <a:ext uri="{909E8E84-426E-40dd-AFC4-6F175D3DCCD1}">
-              <a14:hiddenFill xmlns:a14="http://schemas.microsoft.com/office/drawing/2010/main" xmlns="">
+              <a14:hiddenFill xmlns="" xmlns:a14="http://schemas.microsoft.com/office/drawing/2010/main">
                 <a:solidFill>
                   <a:schemeClr val="accent1"/>
                 </a:solidFill>
               </a14:hiddenFill>
             </a:ext>
             <a:ext uri="{91240B29-F687-4f45-9708-019B960494DF}">
-              <a14:hiddenLine xmlns:a14="http://schemas.microsoft.com/office/drawing/2010/main" xmlns="" w="9525">
+              <a14:hiddenLine xmlns="" xmlns:a14="http://schemas.microsoft.com/office/drawing/2010/main" w="9525">
                 <a:solidFill>
                   <a:schemeClr val="tx1"/>
                 </a:solidFill>
@@ -4446,7 +4387,7 @@
               </a14:hiddenLine>
             </a:ext>
             <a:ext uri="{AF507438-7753-43e0-B8FC-AC1667EBCBE1}">
-              <a14:hiddenEffects xmlns:a14="http://schemas.microsoft.com/office/drawing/2010/main" xmlns="">
+              <a14:hiddenEffects xmlns="" xmlns:a14="http://schemas.microsoft.com/office/drawing/2010/main">
                 <a:effectLst>
                   <a:outerShdw blurRad="63500" dist="38099" dir="2700000" algn="ctr" rotWithShape="0">
                     <a:schemeClr val="bg2">
@@ -4548,7 +4489,7 @@
           <a:noFill/>
           <a:extLst>
             <a:ext uri="{909E8E84-426E-40dd-AFC4-6F175D3DCCD1}">
-              <a14:hiddenFill xmlns:a14="http://schemas.microsoft.com/office/drawing/2010/main" xmlns="">
+              <a14:hiddenFill xmlns="" xmlns:a14="http://schemas.microsoft.com/office/drawing/2010/main">
                 <a:solidFill>
                   <a:srgbClr val="FFFFFF"/>
                 </a:solidFill>
@@ -4589,7 +4530,7 @@
           <a:noFill/>
           <a:extLst>
             <a:ext uri="{909E8E84-426E-40dd-AFC4-6F175D3DCCD1}">
-              <a14:hiddenFill xmlns:a14="http://schemas.microsoft.com/office/drawing/2010/main" xmlns="">
+              <a14:hiddenFill xmlns="" xmlns:a14="http://schemas.microsoft.com/office/drawing/2010/main">
                 <a:solidFill>
                   <a:srgbClr val="FFFFFF"/>
                 </a:solidFill>
@@ -4627,14 +4568,14 @@
           <a:effectLst/>
           <a:extLst>
             <a:ext uri="{909E8E84-426E-40dd-AFC4-6F175D3DCCD1}">
-              <a14:hiddenFill xmlns:a14="http://schemas.microsoft.com/office/drawing/2010/main" xmlns="">
+              <a14:hiddenFill xmlns="" xmlns:a14="http://schemas.microsoft.com/office/drawing/2010/main">
                 <a:solidFill>
                   <a:schemeClr val="accent1"/>
                 </a:solidFill>
               </a14:hiddenFill>
             </a:ext>
             <a:ext uri="{91240B29-F687-4f45-9708-019B960494DF}">
-              <a14:hiddenLine xmlns:a14="http://schemas.microsoft.com/office/drawing/2010/main" xmlns="" w="9525">
+              <a14:hiddenLine xmlns="" xmlns:a14="http://schemas.microsoft.com/office/drawing/2010/main" w="9525">
                 <a:solidFill>
                   <a:schemeClr val="tx1"/>
                 </a:solidFill>
@@ -4644,7 +4585,7 @@
               </a14:hiddenLine>
             </a:ext>
             <a:ext uri="{AF507438-7753-43e0-B8FC-AC1667EBCBE1}">
-              <a14:hiddenEffects xmlns:a14="http://schemas.microsoft.com/office/drawing/2010/main" xmlns="">
+              <a14:hiddenEffects xmlns="" xmlns:a14="http://schemas.microsoft.com/office/drawing/2010/main">
                 <a:effectLst>
                   <a:outerShdw blurRad="63500" dist="38099" dir="2700000" algn="ctr" rotWithShape="0">
                     <a:schemeClr val="bg2">
@@ -5259,273 +5200,6 @@
           <a:chExt cx="0" cy="0"/>
         </a:xfrm>
       </p:grpSpPr>
-      <p:graphicFrame>
-        <p:nvGraphicFramePr>
-          <p:cNvPr id="7" name="Objekt 6" hidden="1">
-            <a:extLst>
-              <a:ext uri="{FF2B5EF4-FFF2-40B4-BE49-F238E27FC236}">
-                <a16:creationId xmlns:a16="http://schemas.microsoft.com/office/drawing/2014/main" id="{AB2331E4-4F67-454B-888C-9BB79CF6C6ED}"/>
-              </a:ext>
-            </a:extLst>
-          </p:cNvPr>
-          <p:cNvGraphicFramePr>
-            <a:graphicFrameLocks noChangeAspect="1"/>
-          </p:cNvGraphicFramePr>
-          <p:nvPr>
-            <p:custDataLst>
-              <p:tags r:id="rId1"/>
-            </p:custDataLst>
-            <p:extLst>
-              <p:ext uri="{D42A27DB-BD31-4B8C-83A1-F6EECF244321}">
-                <p14:modId xmlns:p14="http://schemas.microsoft.com/office/powerpoint/2010/main" val="1680052543"/>
-              </p:ext>
-            </p:extLst>
-          </p:nvPr>
-        </p:nvGraphicFramePr>
-        <p:xfrm>
-          <a:off x="1588" y="1588"/>
-          <a:ext cx="1587" cy="1587"/>
-        </p:xfrm>
-        <a:graphic>
-          <a:graphicData uri="http://schemas.openxmlformats.org/presentationml/2006/ole">
-            <mc:AlternateContent xmlns:mc="http://schemas.openxmlformats.org/markup-compatibility/2006">
-              <mc:Choice xmlns:v="urn:schemas-microsoft-com:vml" Requires="v">
-                <p:oleObj name="think-cell Folie" r:id="rId5" imgW="7772400" imgH="10058400" progId="TCLayout.ActiveDocument.1">
-                  <p:embed/>
-                </p:oleObj>
-              </mc:Choice>
-              <mc:Fallback>
-                <p:oleObj name="think-cell Folie" r:id="rId5" imgW="7772400" imgH="10058400" progId="TCLayout.ActiveDocument.1">
-                  <p:embed/>
-                  <p:pic>
-                    <p:nvPicPr>
-                      <p:cNvPr id="7" name="Objekt 6" hidden="1">
-                        <a:extLst>
-                          <a:ext uri="{FF2B5EF4-FFF2-40B4-BE49-F238E27FC236}">
-                            <a16:creationId xmlns:a16="http://schemas.microsoft.com/office/drawing/2014/main" id="{AB2331E4-4F67-454B-888C-9BB79CF6C6ED}"/>
-                          </a:ext>
-                        </a:extLst>
-                      </p:cNvPr>
-                      <p:cNvPicPr/>
-                      <p:nvPr/>
-                    </p:nvPicPr>
-                    <p:blipFill>
-                      <a:blip r:embed="rId6"/>
-                      <a:stretch>
-                        <a:fillRect/>
-                      </a:stretch>
-                    </p:blipFill>
-                    <p:spPr>
-                      <a:xfrm>
-                        <a:off x="1588" y="1588"/>
-                        <a:ext cx="1587" cy="1587"/>
-                      </a:xfrm>
-                      <a:prstGeom prst="rect">
-                        <a:avLst/>
-                      </a:prstGeom>
-                    </p:spPr>
-                  </p:pic>
-                </p:oleObj>
-              </mc:Fallback>
-            </mc:AlternateContent>
-          </a:graphicData>
-        </a:graphic>
-      </p:graphicFrame>
-      <p:sp>
-        <p:nvSpPr>
-          <p:cNvPr id="6" name="Rechteck 5" hidden="1">
-            <a:extLst>
-              <a:ext uri="{FF2B5EF4-FFF2-40B4-BE49-F238E27FC236}">
-                <a16:creationId xmlns:a16="http://schemas.microsoft.com/office/drawing/2014/main" id="{46BBD7AE-88FF-224A-8696-365ADDCC28D0}"/>
-              </a:ext>
-            </a:extLst>
-          </p:cNvPr>
-          <p:cNvSpPr/>
-          <p:nvPr>
-            <p:custDataLst>
-              <p:tags r:id="rId2"/>
-            </p:custDataLst>
-          </p:nvPr>
-        </p:nvSpPr>
-        <p:spPr bwMode="auto">
-          <a:xfrm>
-            <a:off x="0" y="0"/>
-            <a:ext cx="158750" cy="158750"/>
-          </a:xfrm>
-          <a:prstGeom prst="rect">
-            <a:avLst/>
-          </a:prstGeom>
-          <a:noFill/>
-          <a:ln w="127000" cap="flat" cmpd="sng" algn="ctr">
-            <a:solidFill>
-              <a:schemeClr val="tx1"/>
-            </a:solidFill>
-            <a:prstDash val="solid"/>
-            <a:round/>
-            <a:headEnd type="none" w="med" len="med"/>
-            <a:tailEnd type="none" w="med" len="med"/>
-          </a:ln>
-          <a:effectLst/>
-          <a:extLst>
-            <a:ext uri="{909E8E84-426E-40dd-AFC4-6F175D3DCCD1}">
-              <a14:hiddenFill xmlns:a14="http://schemas.microsoft.com/office/drawing/2010/main" xmlns="">
-                <a:solidFill>
-                  <a:schemeClr val="accent2"/>
-                </a:solidFill>
-              </a14:hiddenFill>
-            </a:ext>
-            <a:ext uri="{AF507438-7753-43e0-B8FC-AC1667EBCBE1}">
-              <a14:hiddenEffects xmlns:a14="http://schemas.microsoft.com/office/drawing/2010/main" xmlns="">
-                <a:effectLst>
-                  <a:outerShdw blurRad="63500" dist="35921" dir="2700000" algn="ctr" rotWithShape="0">
-                    <a:schemeClr val="bg2"/>
-                  </a:outerShdw>
-                </a:effectLst>
-              </a14:hiddenEffects>
-            </a:ext>
-          </a:extLst>
-        </p:spPr>
-        <p:txBody>
-          <a:bodyPr vert="horz" wrap="none" lIns="0" tIns="0" rIns="0" bIns="0" numCol="1" spcCol="0" rtlCol="0" anchor="ctr" anchorCtr="0" compatLnSpc="1">
-            <a:prstTxWarp prst="textNoShape">
-              <a:avLst/>
-            </a:prstTxWarp>
-            <a:noAutofit/>
-          </a:bodyPr>
-          <a:lstStyle/>
-          <a:p>
-            <a:endParaRPr kumimoji="0" lang="en-GB" sz="2400" b="1" u="none" strike="noStrike" cap="none" normalizeH="0" dirty="0">
-              <a:ln>
-                <a:noFill/>
-              </a:ln>
-              <a:solidFill>
-                <a:srgbClr val="000000"/>
-              </a:solidFill>
-              <a:effectLst/>
-              <a:latin typeface="Arial" panose="020B0604020202020204" pitchFamily="34" charset="0"/>
-              <a:ea typeface="ＭＳ Ｐゴシック" panose="020B0600070205080204" pitchFamily="34" charset="-128"/>
-              <a:sym typeface="Arial" panose="020B0604020202020204" pitchFamily="34" charset="0"/>
-            </a:endParaRPr>
-          </a:p>
-        </p:txBody>
-      </p:sp>
-      <p:sp>
-        <p:nvSpPr>
-          <p:cNvPr id="2" name="Inhaltsplatzhalter 1">
-            <a:extLst>
-              <a:ext uri="{FF2B5EF4-FFF2-40B4-BE49-F238E27FC236}">
-                <a16:creationId xmlns:a16="http://schemas.microsoft.com/office/drawing/2014/main" id="{B26A0BFC-89E4-9E41-9E2A-73DC9B952558}"/>
-              </a:ext>
-            </a:extLst>
-          </p:cNvPr>
-          <p:cNvSpPr>
-            <a:spLocks noGrp="1"/>
-          </p:cNvSpPr>
-          <p:nvPr>
-            <p:ph idx="13"/>
-          </p:nvPr>
-        </p:nvSpPr>
-        <p:spPr/>
-        <p:txBody>
-          <a:bodyPr/>
-          <a:lstStyle/>
-          <a:p>
-            <a:r>
-              <a:rPr lang="en-GB" dirty="0"/>
-              <a:t>In this Presentation, we will …</a:t>
-            </a:r>
-          </a:p>
-        </p:txBody>
-      </p:sp>
-      <p:sp>
-        <p:nvSpPr>
-          <p:cNvPr id="3" name="Titel 2">
-            <a:extLst>
-              <a:ext uri="{FF2B5EF4-FFF2-40B4-BE49-F238E27FC236}">
-                <a16:creationId xmlns:a16="http://schemas.microsoft.com/office/drawing/2014/main" id="{E8D85132-04D1-7F46-A4AF-02DDEAEA9D26}"/>
-              </a:ext>
-            </a:extLst>
-          </p:cNvPr>
-          <p:cNvSpPr>
-            <a:spLocks noGrp="1"/>
-          </p:cNvSpPr>
-          <p:nvPr>
-            <p:ph type="title"/>
-          </p:nvPr>
-        </p:nvSpPr>
-        <p:spPr/>
-        <p:txBody>
-          <a:bodyPr/>
-          <a:lstStyle/>
-          <a:p>
-            <a:r>
-              <a:rPr lang="en-GB" dirty="0"/>
-              <a:t>Stream Processing</a:t>
-            </a:r>
-          </a:p>
-        </p:txBody>
-      </p:sp>
-      <p:sp>
-        <p:nvSpPr>
-          <p:cNvPr id="4" name="Textplatzhalter 3">
-            <a:extLst>
-              <a:ext uri="{FF2B5EF4-FFF2-40B4-BE49-F238E27FC236}">
-                <a16:creationId xmlns:a16="http://schemas.microsoft.com/office/drawing/2014/main" id="{4D289530-F87B-864C-B74B-940411A7DA7E}"/>
-              </a:ext>
-            </a:extLst>
-          </p:cNvPr>
-          <p:cNvSpPr>
-            <a:spLocks noGrp="1"/>
-          </p:cNvSpPr>
-          <p:nvPr>
-            <p:ph type="body" sz="quarter" idx="12"/>
-          </p:nvPr>
-        </p:nvSpPr>
-        <p:spPr/>
-        <p:txBody>
-          <a:bodyPr/>
-          <a:lstStyle/>
-          <a:p>
-            <a:r>
-              <a:rPr lang="en-GB" dirty="0"/>
-              <a:t>Introduction: Example</a:t>
-            </a:r>
-          </a:p>
-        </p:txBody>
-      </p:sp>
-    </p:spTree>
-    <p:extLst>
-      <p:ext uri="{BB962C8B-B14F-4D97-AF65-F5344CB8AC3E}">
-        <p14:creationId xmlns:p14="http://schemas.microsoft.com/office/powerpoint/2010/main" val="928857652"/>
-      </p:ext>
-    </p:extLst>
-  </p:cSld>
-  <p:clrMapOvr>
-    <a:masterClrMapping/>
-  </p:clrMapOvr>
-  <p:transition>
-    <p:dissolve/>
-  </p:transition>
-</p:sld>
-</file>
-
-<file path=ppt/slides/slide3.xml><?xml version="1.0" encoding="utf-8"?>
-<p:sld xmlns:a="http://schemas.openxmlformats.org/drawingml/2006/main" xmlns:r="http://schemas.openxmlformats.org/officeDocument/2006/relationships" xmlns:p="http://schemas.openxmlformats.org/presentationml/2006/main">
-  <p:cSld>
-    <p:spTree>
-      <p:nvGrpSpPr>
-        <p:cNvPr id="1" name=""/>
-        <p:cNvGrpSpPr/>
-        <p:nvPr/>
-      </p:nvGrpSpPr>
-      <p:grpSpPr>
-        <a:xfrm>
-          <a:off x="0" y="0"/>
-          <a:ext cx="0" cy="0"/>
-          <a:chOff x="0" y="0"/>
-          <a:chExt cx="0" cy="0"/>
-        </a:xfrm>
-      </p:grpSpPr>
       <p:sp>
         <p:nvSpPr>
           <p:cNvPr id="19" name="Title 1">
@@ -5689,6 +5363,109 @@
           </a:p>
         </p:txBody>
       </p:sp>
+      <p:pic>
+        <p:nvPicPr>
+          <p:cNvPr id="1026" name="Picture 2">
+            <a:extLst>
+              <a:ext uri="{FF2B5EF4-FFF2-40B4-BE49-F238E27FC236}">
+                <a16:creationId xmlns:a16="http://schemas.microsoft.com/office/drawing/2014/main" id="{C0378AA6-CECB-A95F-270C-4C636CFE72BB}"/>
+              </a:ext>
+            </a:extLst>
+          </p:cNvPr>
+          <p:cNvPicPr>
+            <a:picLocks noChangeAspect="1" noChangeArrowheads="1"/>
+          </p:cNvPicPr>
+          <p:nvPr/>
+        </p:nvPicPr>
+        <p:blipFill>
+          <a:blip r:embed="rId3">
+            <a:extLst>
+              <a:ext uri="{BEBA8EAE-BF5A-486C-A8C5-ECC9F3942E4B}">
+                <a14:imgProps xmlns:a14="http://schemas.microsoft.com/office/drawing/2010/main">
+                  <a14:imgLayer r:embed="rId4">
+                    <a14:imgEffect>
+                      <a14:brightnessContrast bright="20000" contrast="20000"/>
+                    </a14:imgEffect>
+                  </a14:imgLayer>
+                </a14:imgProps>
+              </a:ext>
+              <a:ext uri="{28A0092B-C50C-407E-A947-70E740481C1C}">
+                <a14:useLocalDpi xmlns:a14="http://schemas.microsoft.com/office/drawing/2010/main" val="0"/>
+              </a:ext>
+            </a:extLst>
+          </a:blip>
+          <a:srcRect/>
+          <a:stretch>
+            <a:fillRect/>
+          </a:stretch>
+        </p:blipFill>
+        <p:spPr bwMode="auto">
+          <a:xfrm>
+            <a:off x="2204796" y="1677972"/>
+            <a:ext cx="1417752" cy="568642"/>
+          </a:xfrm>
+          <a:prstGeom prst="rect">
+            <a:avLst/>
+          </a:prstGeom>
+          <a:noFill/>
+          <a:extLst>
+            <a:ext uri="{909E8E84-426E-40DD-AFC4-6F175D3DCCD1}">
+              <a14:hiddenFill xmlns:a14="http://schemas.microsoft.com/office/drawing/2010/main">
+                <a:solidFill>
+                  <a:srgbClr val="FFFFFF"/>
+                </a:solidFill>
+              </a14:hiddenFill>
+            </a:ext>
+          </a:extLst>
+        </p:spPr>
+      </p:pic>
+      <p:pic>
+        <p:nvPicPr>
+          <p:cNvPr id="2" name="Picture 2">
+            <a:extLst>
+              <a:ext uri="{FF2B5EF4-FFF2-40B4-BE49-F238E27FC236}">
+                <a16:creationId xmlns:a16="http://schemas.microsoft.com/office/drawing/2014/main" id="{856EC771-B7A2-1742-1C0A-897B71F8DAE5}"/>
+              </a:ext>
+            </a:extLst>
+          </p:cNvPr>
+          <p:cNvPicPr>
+            <a:picLocks noChangeAspect="1" noChangeArrowheads="1"/>
+          </p:cNvPicPr>
+          <p:nvPr/>
+        </p:nvPicPr>
+        <p:blipFill>
+          <a:blip r:embed="rId5">
+            <a:extLst>
+              <a:ext uri="{28A0092B-C50C-407E-A947-70E740481C1C}">
+                <a14:useLocalDpi xmlns:a14="http://schemas.microsoft.com/office/drawing/2010/main" val="0"/>
+              </a:ext>
+            </a:extLst>
+          </a:blip>
+          <a:srcRect/>
+          <a:stretch>
+            <a:fillRect/>
+          </a:stretch>
+        </p:blipFill>
+        <p:spPr bwMode="auto">
+          <a:xfrm>
+            <a:off x="4260292" y="1160068"/>
+            <a:ext cx="1261161" cy="568642"/>
+          </a:xfrm>
+          <a:prstGeom prst="rect">
+            <a:avLst/>
+          </a:prstGeom>
+          <a:noFill/>
+          <a:extLst>
+            <a:ext uri="{909E8E84-426E-40DD-AFC4-6F175D3DCCD1}">
+              <a14:hiddenFill xmlns:a14="http://schemas.microsoft.com/office/drawing/2010/main">
+                <a:solidFill>
+                  <a:srgbClr val="FFFFFF"/>
+                </a:solidFill>
+              </a14:hiddenFill>
+            </a:ext>
+          </a:extLst>
+        </p:spPr>
+      </p:pic>
     </p:spTree>
     <p:extLst>
       <p:ext uri="{BB962C8B-B14F-4D97-AF65-F5344CB8AC3E}">
@@ -5702,10 +5479,692 @@
   <p:transition>
     <p:dissolve/>
   </p:transition>
+  <p:timing>
+    <p:tnLst>
+      <p:par>
+        <p:cTn id="1" dur="indefinite" restart="never" nodeType="tmRoot">
+          <p:childTnLst>
+            <p:seq concurrent="1" nextAc="seek">
+              <p:cTn id="2" dur="indefinite" nodeType="mainSeq">
+                <p:childTnLst>
+                  <p:par>
+                    <p:cTn id="3" fill="hold">
+                      <p:stCondLst>
+                        <p:cond delay="indefinite"/>
+                      </p:stCondLst>
+                      <p:childTnLst>
+                        <p:par>
+                          <p:cTn id="4" fill="hold">
+                            <p:stCondLst>
+                              <p:cond delay="0"/>
+                            </p:stCondLst>
+                            <p:childTnLst>
+                              <p:par>
+                                <p:cTn id="5" presetID="1" presetClass="entr" presetSubtype="0" fill="hold" nodeType="clickEffect">
+                                  <p:stCondLst>
+                                    <p:cond delay="0"/>
+                                  </p:stCondLst>
+                                  <p:childTnLst>
+                                    <p:set>
+                                      <p:cBhvr>
+                                        <p:cTn id="6" dur="1" fill="hold">
+                                          <p:stCondLst>
+                                            <p:cond delay="0"/>
+                                          </p:stCondLst>
+                                        </p:cTn>
+                                        <p:tgtEl>
+                                          <p:spTgt spid="1026"/>
+                                        </p:tgtEl>
+                                        <p:attrNameLst>
+                                          <p:attrName>style.visibility</p:attrName>
+                                        </p:attrNameLst>
+                                      </p:cBhvr>
+                                      <p:to>
+                                        <p:strVal val="visible"/>
+                                      </p:to>
+                                    </p:set>
+                                  </p:childTnLst>
+                                </p:cTn>
+                              </p:par>
+                            </p:childTnLst>
+                          </p:cTn>
+                        </p:par>
+                      </p:childTnLst>
+                    </p:cTn>
+                  </p:par>
+                  <p:par>
+                    <p:cTn id="7" fill="hold">
+                      <p:stCondLst>
+                        <p:cond delay="indefinite"/>
+                      </p:stCondLst>
+                      <p:childTnLst>
+                        <p:par>
+                          <p:cTn id="8" fill="hold">
+                            <p:stCondLst>
+                              <p:cond delay="0"/>
+                            </p:stCondLst>
+                            <p:childTnLst>
+                              <p:par>
+                                <p:cTn id="9" presetID="1" presetClass="entr" presetSubtype="0" fill="hold" nodeType="clickEffect">
+                                  <p:stCondLst>
+                                    <p:cond delay="0"/>
+                                  </p:stCondLst>
+                                  <p:childTnLst>
+                                    <p:set>
+                                      <p:cBhvr>
+                                        <p:cTn id="10" dur="1" fill="hold">
+                                          <p:stCondLst>
+                                            <p:cond delay="0"/>
+                                          </p:stCondLst>
+                                        </p:cTn>
+                                        <p:tgtEl>
+                                          <p:spTgt spid="2"/>
+                                        </p:tgtEl>
+                                        <p:attrNameLst>
+                                          <p:attrName>style.visibility</p:attrName>
+                                        </p:attrNameLst>
+                                      </p:cBhvr>
+                                      <p:to>
+                                        <p:strVal val="visible"/>
+                                      </p:to>
+                                    </p:set>
+                                  </p:childTnLst>
+                                </p:cTn>
+                              </p:par>
+                            </p:childTnLst>
+                          </p:cTn>
+                        </p:par>
+                      </p:childTnLst>
+                    </p:cTn>
+                  </p:par>
+                </p:childTnLst>
+              </p:cTn>
+              <p:prevCondLst>
+                <p:cond evt="onPrev" delay="0">
+                  <p:tgtEl>
+                    <p:sldTgt/>
+                  </p:tgtEl>
+                </p:cond>
+              </p:prevCondLst>
+              <p:nextCondLst>
+                <p:cond evt="onNext" delay="0">
+                  <p:tgtEl>
+                    <p:sldTgt/>
+                  </p:tgtEl>
+                </p:cond>
+              </p:nextCondLst>
+            </p:seq>
+          </p:childTnLst>
+        </p:cTn>
+      </p:par>
+    </p:tnLst>
+  </p:timing>
+</p:sld>
+</file>
+
+<file path=ppt/slides/slide3.xml><?xml version="1.0" encoding="utf-8"?>
+<p:sld xmlns:a="http://schemas.openxmlformats.org/drawingml/2006/main" xmlns:r="http://schemas.openxmlformats.org/officeDocument/2006/relationships" xmlns:p="http://schemas.openxmlformats.org/presentationml/2006/main">
+  <p:cSld>
+    <p:spTree>
+      <p:nvGrpSpPr>
+        <p:cNvPr id="1" name=""/>
+        <p:cNvGrpSpPr/>
+        <p:nvPr/>
+      </p:nvGrpSpPr>
+      <p:grpSpPr>
+        <a:xfrm>
+          <a:off x="0" y="0"/>
+          <a:ext cx="0" cy="0"/>
+          <a:chOff x="0" y="0"/>
+          <a:chExt cx="0" cy="0"/>
+        </a:xfrm>
+      </p:grpSpPr>
+      <p:sp>
+        <p:nvSpPr>
+          <p:cNvPr id="2" name="Title 1">
+            <a:extLst>
+              <a:ext uri="{FF2B5EF4-FFF2-40B4-BE49-F238E27FC236}">
+                <a16:creationId xmlns:a16="http://schemas.microsoft.com/office/drawing/2014/main" id="{420B59B2-5D95-AFA7-7DC0-F27C0AA5C970}"/>
+              </a:ext>
+            </a:extLst>
+          </p:cNvPr>
+          <p:cNvSpPr>
+            <a:spLocks noGrp="1"/>
+          </p:cNvSpPr>
+          <p:nvPr>
+            <p:ph type="title"/>
+          </p:nvPr>
+        </p:nvSpPr>
+        <p:spPr>
+          <a:xfrm>
+            <a:off x="573088" y="184706"/>
+            <a:ext cx="8063999" cy="369332"/>
+          </a:xfrm>
+        </p:spPr>
+        <p:txBody>
+          <a:bodyPr anchor="ctr">
+            <a:noAutofit/>
+          </a:bodyPr>
+          <a:lstStyle/>
+          <a:p>
+            <a:pPr>
+              <a:lnSpc>
+                <a:spcPct val="90000"/>
+              </a:lnSpc>
+            </a:pPr>
+            <a:r>
+              <a:rPr lang="en-US" dirty="0"/>
+              <a:t>Introduction to Apache Kafka</a:t>
+            </a:r>
+          </a:p>
+        </p:txBody>
+      </p:sp>
+      <p:sp>
+        <p:nvSpPr>
+          <p:cNvPr id="15" name="Content Placeholder 3">
+            <a:extLst>
+              <a:ext uri="{FF2B5EF4-FFF2-40B4-BE49-F238E27FC236}">
+                <a16:creationId xmlns:a16="http://schemas.microsoft.com/office/drawing/2014/main" id="{7176AFD4-2854-20FE-6647-2E7DC6466E1F}"/>
+              </a:ext>
+            </a:extLst>
+          </p:cNvPr>
+          <p:cNvSpPr>
+            <a:spLocks noGrp="1"/>
+          </p:cNvSpPr>
+          <p:nvPr>
+            <p:ph sz="quarter" idx="10"/>
+          </p:nvPr>
+        </p:nvSpPr>
+        <p:spPr>
+          <a:xfrm>
+            <a:off x="1286541" y="5818708"/>
+            <a:ext cx="7350546" cy="292162"/>
+          </a:xfrm>
+        </p:spPr>
+        <p:txBody>
+          <a:bodyPr/>
+          <a:lstStyle/>
+          <a:p>
+            <a:r>
+              <a:rPr lang="en-US" dirty="0"/>
+              <a:t>Garg, Nishant. Apache </a:t>
+            </a:r>
+            <a:r>
+              <a:rPr lang="en-US" dirty="0" err="1"/>
+              <a:t>kafka</a:t>
+            </a:r>
+            <a:r>
+              <a:rPr lang="en-US" dirty="0"/>
+              <a:t>. Birmingham, UK: </a:t>
+            </a:r>
+            <a:r>
+              <a:rPr lang="en-US" dirty="0" err="1"/>
+              <a:t>Packt</a:t>
+            </a:r>
+            <a:r>
+              <a:rPr lang="en-US" dirty="0"/>
+              <a:t> Publishing, 2013.</a:t>
+            </a:r>
+          </a:p>
+        </p:txBody>
+      </p:sp>
+      <p:sp>
+        <p:nvSpPr>
+          <p:cNvPr id="4" name="Text Placeholder 3">
+            <a:extLst>
+              <a:ext uri="{FF2B5EF4-FFF2-40B4-BE49-F238E27FC236}">
+                <a16:creationId xmlns:a16="http://schemas.microsoft.com/office/drawing/2014/main" id="{BBA48FA6-A484-8C09-3659-CB7BB84B2DAE}"/>
+              </a:ext>
+            </a:extLst>
+          </p:cNvPr>
+          <p:cNvSpPr>
+            <a:spLocks noGrp="1"/>
+          </p:cNvSpPr>
+          <p:nvPr>
+            <p:ph type="body" sz="quarter" idx="12"/>
+          </p:nvPr>
+        </p:nvSpPr>
+        <p:spPr>
+          <a:xfrm>
+            <a:off x="573088" y="581897"/>
+            <a:ext cx="8063999" cy="274637"/>
+          </a:xfrm>
+        </p:spPr>
+        <p:txBody>
+          <a:bodyPr anchor="ctr">
+            <a:noAutofit/>
+          </a:bodyPr>
+          <a:lstStyle/>
+          <a:p>
+            <a:pPr>
+              <a:lnSpc>
+                <a:spcPct val="90000"/>
+              </a:lnSpc>
+            </a:pPr>
+            <a:r>
+              <a:rPr lang="en-US" dirty="0"/>
+              <a:t>De Facto Standard API for Event Streaming</a:t>
+            </a:r>
+          </a:p>
+        </p:txBody>
+      </p:sp>
+      <p:pic>
+        <p:nvPicPr>
+          <p:cNvPr id="3" name="Picture 2">
+            <a:extLst>
+              <a:ext uri="{FF2B5EF4-FFF2-40B4-BE49-F238E27FC236}">
+                <a16:creationId xmlns:a16="http://schemas.microsoft.com/office/drawing/2014/main" id="{982B9C89-9BE2-305B-3C12-9B5DFD8C6270}"/>
+              </a:ext>
+            </a:extLst>
+          </p:cNvPr>
+          <p:cNvPicPr>
+            <a:picLocks/>
+          </p:cNvPicPr>
+          <p:nvPr/>
+        </p:nvPicPr>
+        <p:blipFill>
+          <a:blip r:embed="rId2"/>
+          <a:stretch>
+            <a:fillRect/>
+          </a:stretch>
+        </p:blipFill>
+        <p:spPr>
+          <a:xfrm>
+            <a:off x="1123950" y="1456258"/>
+            <a:ext cx="6896100" cy="4362450"/>
+          </a:xfrm>
+          <a:prstGeom prst="rect">
+            <a:avLst/>
+          </a:prstGeom>
+        </p:spPr>
+      </p:pic>
+    </p:spTree>
+    <p:extLst>
+      <p:ext uri="{BB962C8B-B14F-4D97-AF65-F5344CB8AC3E}">
+        <p14:creationId xmlns:p14="http://schemas.microsoft.com/office/powerpoint/2010/main" val="1759009046"/>
+      </p:ext>
+    </p:extLst>
+  </p:cSld>
+  <p:clrMapOvr>
+    <a:masterClrMapping/>
+  </p:clrMapOvr>
+  <p:transition>
+    <p:dissolve/>
+  </p:transition>
 </p:sld>
 </file>
 
 <file path=ppt/slides/slide4.xml><?xml version="1.0" encoding="utf-8"?>
+<p:sld xmlns:a="http://schemas.openxmlformats.org/drawingml/2006/main" xmlns:r="http://schemas.openxmlformats.org/officeDocument/2006/relationships" xmlns:p="http://schemas.openxmlformats.org/presentationml/2006/main">
+  <p:cSld>
+    <p:spTree>
+      <p:nvGrpSpPr>
+        <p:cNvPr id="1" name=""/>
+        <p:cNvGrpSpPr/>
+        <p:nvPr/>
+      </p:nvGrpSpPr>
+      <p:grpSpPr>
+        <a:xfrm>
+          <a:off x="0" y="0"/>
+          <a:ext cx="0" cy="0"/>
+          <a:chOff x="0" y="0"/>
+          <a:chExt cx="0" cy="0"/>
+        </a:xfrm>
+      </p:grpSpPr>
+      <p:sp>
+        <p:nvSpPr>
+          <p:cNvPr id="2" name="Title 1">
+            <a:extLst>
+              <a:ext uri="{FF2B5EF4-FFF2-40B4-BE49-F238E27FC236}">
+                <a16:creationId xmlns:a16="http://schemas.microsoft.com/office/drawing/2014/main" id="{F82A0E51-75A2-CA34-9580-281050D3A036}"/>
+              </a:ext>
+            </a:extLst>
+          </p:cNvPr>
+          <p:cNvSpPr>
+            <a:spLocks noGrp="1"/>
+          </p:cNvSpPr>
+          <p:nvPr>
+            <p:ph type="title"/>
+          </p:nvPr>
+        </p:nvSpPr>
+        <p:spPr>
+          <a:xfrm>
+            <a:off x="573088" y="184706"/>
+            <a:ext cx="8063999" cy="369332"/>
+          </a:xfrm>
+        </p:spPr>
+        <p:txBody>
+          <a:bodyPr anchor="ctr">
+            <a:noAutofit/>
+          </a:bodyPr>
+          <a:lstStyle/>
+          <a:p>
+            <a:pPr>
+              <a:lnSpc>
+                <a:spcPct val="90000"/>
+              </a:lnSpc>
+            </a:pPr>
+            <a:r>
+              <a:rPr lang="en-US" dirty="0"/>
+              <a:t>Apache </a:t>
+            </a:r>
+            <a:r>
+              <a:rPr lang="en-US" dirty="0" err="1"/>
+              <a:t>Flink</a:t>
+            </a:r>
+            <a:endParaRPr lang="en-US" dirty="0"/>
+          </a:p>
+        </p:txBody>
+      </p:sp>
+      <p:pic>
+        <p:nvPicPr>
+          <p:cNvPr id="3" name="Picture 2">
+            <a:extLst>
+              <a:ext uri="{FF2B5EF4-FFF2-40B4-BE49-F238E27FC236}">
+                <a16:creationId xmlns:a16="http://schemas.microsoft.com/office/drawing/2014/main" id="{8FE111B0-ABA7-5F91-3668-25CFA912CDE6}"/>
+              </a:ext>
+            </a:extLst>
+          </p:cNvPr>
+          <p:cNvPicPr>
+            <a:picLocks/>
+          </p:cNvPicPr>
+          <p:nvPr/>
+        </p:nvPicPr>
+        <p:blipFill>
+          <a:blip r:embed="rId2"/>
+          <a:stretch>
+            <a:fillRect/>
+          </a:stretch>
+        </p:blipFill>
+        <p:spPr>
+          <a:xfrm>
+            <a:off x="1106692" y="1448672"/>
+            <a:ext cx="6997291" cy="4338321"/>
+          </a:xfrm>
+          <a:prstGeom prst="rect">
+            <a:avLst/>
+          </a:prstGeom>
+          <a:noFill/>
+        </p:spPr>
+      </p:pic>
+      <p:sp>
+        <p:nvSpPr>
+          <p:cNvPr id="1036" name="Content Placeholder 3">
+            <a:extLst>
+              <a:ext uri="{FF2B5EF4-FFF2-40B4-BE49-F238E27FC236}">
+                <a16:creationId xmlns:a16="http://schemas.microsoft.com/office/drawing/2014/main" id="{BD47D014-6E1A-C7F8-2F87-525DED66E6E9}"/>
+              </a:ext>
+            </a:extLst>
+          </p:cNvPr>
+          <p:cNvSpPr>
+            <a:spLocks noGrp="1"/>
+          </p:cNvSpPr>
+          <p:nvPr>
+            <p:ph sz="quarter" idx="10"/>
+          </p:nvPr>
+        </p:nvSpPr>
+        <p:spPr>
+          <a:xfrm>
+            <a:off x="1286541" y="5818708"/>
+            <a:ext cx="7350546" cy="292162"/>
+          </a:xfrm>
+        </p:spPr>
+        <p:txBody>
+          <a:bodyPr/>
+          <a:lstStyle/>
+          <a:p>
+            <a:r>
+              <a:rPr lang="en-US" dirty="0"/>
+              <a:t>Apache </a:t>
+            </a:r>
+            <a:r>
+              <a:rPr lang="en-US" dirty="0" err="1"/>
+              <a:t>Flink</a:t>
+            </a:r>
+            <a:r>
+              <a:rPr lang="en-US" dirty="0"/>
+              <a:t> Documentation: https://nightlies.apache.org/flink/flink-docs-release-1.16/docs/concepts/flink-architecture/</a:t>
+            </a:r>
+          </a:p>
+        </p:txBody>
+      </p:sp>
+      <p:sp>
+        <p:nvSpPr>
+          <p:cNvPr id="4" name="Text Placeholder 3">
+            <a:extLst>
+              <a:ext uri="{FF2B5EF4-FFF2-40B4-BE49-F238E27FC236}">
+                <a16:creationId xmlns:a16="http://schemas.microsoft.com/office/drawing/2014/main" id="{C169D33C-2F40-96A5-7E76-2F394A27FDAA}"/>
+              </a:ext>
+            </a:extLst>
+          </p:cNvPr>
+          <p:cNvSpPr>
+            <a:spLocks noGrp="1"/>
+          </p:cNvSpPr>
+          <p:nvPr>
+            <p:ph type="body" sz="quarter" idx="12"/>
+          </p:nvPr>
+        </p:nvSpPr>
+        <p:spPr>
+          <a:xfrm>
+            <a:off x="573088" y="581897"/>
+            <a:ext cx="8063999" cy="274637"/>
+          </a:xfrm>
+        </p:spPr>
+        <p:txBody>
+          <a:bodyPr anchor="ctr">
+            <a:noAutofit/>
+          </a:bodyPr>
+          <a:lstStyle/>
+          <a:p>
+            <a:pPr>
+              <a:lnSpc>
+                <a:spcPct val="90000"/>
+              </a:lnSpc>
+            </a:pPr>
+            <a:r>
+              <a:rPr lang="en-US" dirty="0"/>
+              <a:t>Stateful Computations over Data Streams</a:t>
+            </a:r>
+          </a:p>
+        </p:txBody>
+      </p:sp>
+    </p:spTree>
+    <p:extLst>
+      <p:ext uri="{BB962C8B-B14F-4D97-AF65-F5344CB8AC3E}">
+        <p14:creationId xmlns:p14="http://schemas.microsoft.com/office/powerpoint/2010/main" val="1813432565"/>
+      </p:ext>
+    </p:extLst>
+  </p:cSld>
+  <p:clrMapOvr>
+    <a:masterClrMapping/>
+  </p:clrMapOvr>
+  <p:transition>
+    <p:dissolve/>
+  </p:transition>
+</p:sld>
+</file>
+
+<file path=ppt/slides/slide5.xml><?xml version="1.0" encoding="utf-8"?>
+<p:sld xmlns:a="http://schemas.openxmlformats.org/drawingml/2006/main" xmlns:r="http://schemas.openxmlformats.org/officeDocument/2006/relationships" xmlns:p="http://schemas.openxmlformats.org/presentationml/2006/main">
+  <p:cSld>
+    <p:spTree>
+      <p:nvGrpSpPr>
+        <p:cNvPr id="1" name=""/>
+        <p:cNvGrpSpPr/>
+        <p:nvPr/>
+      </p:nvGrpSpPr>
+      <p:grpSpPr>
+        <a:xfrm>
+          <a:off x="0" y="0"/>
+          <a:ext cx="0" cy="0"/>
+          <a:chOff x="0" y="0"/>
+          <a:chExt cx="0" cy="0"/>
+        </a:xfrm>
+      </p:grpSpPr>
+      <p:sp>
+        <p:nvSpPr>
+          <p:cNvPr id="2" name="Title 1">
+            <a:extLst>
+              <a:ext uri="{FF2B5EF4-FFF2-40B4-BE49-F238E27FC236}">
+                <a16:creationId xmlns:a16="http://schemas.microsoft.com/office/drawing/2014/main" id="{0A2CA2E0-68D9-7AE9-5DBC-F920E7E76D96}"/>
+              </a:ext>
+            </a:extLst>
+          </p:cNvPr>
+          <p:cNvSpPr>
+            <a:spLocks noGrp="1"/>
+          </p:cNvSpPr>
+          <p:nvPr>
+            <p:ph type="title"/>
+          </p:nvPr>
+        </p:nvSpPr>
+        <p:spPr>
+          <a:xfrm>
+            <a:off x="573088" y="184706"/>
+            <a:ext cx="8063999" cy="369332"/>
+          </a:xfrm>
+        </p:spPr>
+        <p:txBody>
+          <a:bodyPr anchor="ctr">
+            <a:noAutofit/>
+          </a:bodyPr>
+          <a:lstStyle/>
+          <a:p>
+            <a:pPr>
+              <a:lnSpc>
+                <a:spcPct val="90000"/>
+              </a:lnSpc>
+            </a:pPr>
+            <a:r>
+              <a:rPr lang="en-US" dirty="0"/>
+              <a:t>Real Case Study: Twitter</a:t>
+            </a:r>
+          </a:p>
+        </p:txBody>
+      </p:sp>
+      <p:pic>
+        <p:nvPicPr>
+          <p:cNvPr id="5" name="Picture 4">
+            <a:extLst>
+              <a:ext uri="{FF2B5EF4-FFF2-40B4-BE49-F238E27FC236}">
+                <a16:creationId xmlns:a16="http://schemas.microsoft.com/office/drawing/2014/main" id="{FD7310D9-4AD2-CA65-21E9-04829AD6453B}"/>
+              </a:ext>
+            </a:extLst>
+          </p:cNvPr>
+          <p:cNvPicPr>
+            <a:picLocks noChangeAspect="1"/>
+          </p:cNvPicPr>
+          <p:nvPr/>
+        </p:nvPicPr>
+        <p:blipFill>
+          <a:blip r:embed="rId2"/>
+          <a:stretch>
+            <a:fillRect/>
+          </a:stretch>
+        </p:blipFill>
+        <p:spPr>
+          <a:xfrm>
+            <a:off x="1280953" y="1448672"/>
+            <a:ext cx="6648768" cy="4338321"/>
+          </a:xfrm>
+          <a:prstGeom prst="rect">
+            <a:avLst/>
+          </a:prstGeom>
+          <a:noFill/>
+        </p:spPr>
+      </p:pic>
+      <p:sp>
+        <p:nvSpPr>
+          <p:cNvPr id="10" name="Content Placeholder 3">
+            <a:extLst>
+              <a:ext uri="{FF2B5EF4-FFF2-40B4-BE49-F238E27FC236}">
+                <a16:creationId xmlns:a16="http://schemas.microsoft.com/office/drawing/2014/main" id="{C2C11FAD-7D71-9847-B773-4A5DFA2D62A6}"/>
+              </a:ext>
+            </a:extLst>
+          </p:cNvPr>
+          <p:cNvSpPr>
+            <a:spLocks noGrp="1"/>
+          </p:cNvSpPr>
+          <p:nvPr>
+            <p:ph sz="quarter" idx="10"/>
+          </p:nvPr>
+        </p:nvSpPr>
+        <p:spPr>
+          <a:xfrm>
+            <a:off x="1286541" y="5818708"/>
+            <a:ext cx="7350546" cy="292162"/>
+          </a:xfrm>
+        </p:spPr>
+        <p:txBody>
+          <a:bodyPr/>
+          <a:lstStyle/>
+          <a:p>
+            <a:r>
+              <a:rPr lang="en-US" dirty="0"/>
+              <a:t>Twitter Blog: https://blog.twitter.com/engineering/en_us/topics/infrastructure/2021/processing-billions-of-events-in-real-time-at-twitter-</a:t>
+            </a:r>
+          </a:p>
+          <a:p>
+            <a:endParaRPr lang="en-US" dirty="0"/>
+          </a:p>
+        </p:txBody>
+      </p:sp>
+      <p:sp>
+        <p:nvSpPr>
+          <p:cNvPr id="4" name="Text Placeholder 3">
+            <a:extLst>
+              <a:ext uri="{FF2B5EF4-FFF2-40B4-BE49-F238E27FC236}">
+                <a16:creationId xmlns:a16="http://schemas.microsoft.com/office/drawing/2014/main" id="{13AD10CD-C6BE-3FD4-9E9E-4417B1043CD0}"/>
+              </a:ext>
+            </a:extLst>
+          </p:cNvPr>
+          <p:cNvSpPr>
+            <a:spLocks noGrp="1"/>
+          </p:cNvSpPr>
+          <p:nvPr>
+            <p:ph type="body" sz="quarter" idx="12"/>
+          </p:nvPr>
+        </p:nvSpPr>
+        <p:spPr>
+          <a:xfrm>
+            <a:off x="573088" y="581897"/>
+            <a:ext cx="8063999" cy="274637"/>
+          </a:xfrm>
+        </p:spPr>
+        <p:txBody>
+          <a:bodyPr anchor="ctr">
+            <a:noAutofit/>
+          </a:bodyPr>
+          <a:lstStyle/>
+          <a:p>
+            <a:pPr>
+              <a:lnSpc>
+                <a:spcPct val="90000"/>
+              </a:lnSpc>
+            </a:pPr>
+            <a:r>
+              <a:rPr lang="en-US" dirty="0"/>
+              <a:t>After: Kappa</a:t>
+            </a:r>
+          </a:p>
+        </p:txBody>
+      </p:sp>
+    </p:spTree>
+    <p:extLst>
+      <p:ext uri="{BB962C8B-B14F-4D97-AF65-F5344CB8AC3E}">
+        <p14:creationId xmlns:p14="http://schemas.microsoft.com/office/powerpoint/2010/main" val="460075058"/>
+      </p:ext>
+    </p:extLst>
+  </p:cSld>
+  <p:clrMapOvr>
+    <a:masterClrMapping/>
+  </p:clrMapOvr>
+  <p:transition>
+    <p:dissolve/>
+  </p:transition>
+</p:sld>
+</file>
+
+<file path=ppt/slides/slide6.xml><?xml version="1.0" encoding="utf-8"?>
 <p:sld xmlns:a="http://schemas.openxmlformats.org/drawingml/2006/main" xmlns:r="http://schemas.openxmlformats.org/officeDocument/2006/relationships" xmlns:p="http://schemas.openxmlformats.org/presentationml/2006/main">
   <p:cSld>
     <p:spTree>
@@ -5827,6 +6286,124 @@
               <a:rPr lang="en-US" sz="1200" dirty="0"/>
               <a:t> Fundamentals, Implementation, and Operation of Streaming Applications. O’Reilly Media.</a:t>
             </a:r>
+          </a:p>
+          <a:p>
+            <a:r>
+              <a:rPr lang="de-DE" sz="1200" dirty="0"/>
+              <a:t>2. Feick, Martin, Niko Kleer, and Marek Kohn. "</a:t>
+            </a:r>
+            <a:r>
+              <a:rPr lang="de-DE" sz="1200" dirty="0" err="1"/>
+              <a:t>Fundamentals</a:t>
+            </a:r>
+            <a:r>
+              <a:rPr lang="de-DE" sz="1200" dirty="0"/>
+              <a:t> </a:t>
+            </a:r>
+            <a:r>
+              <a:rPr lang="de-DE" sz="1200" dirty="0" err="1"/>
+              <a:t>of</a:t>
+            </a:r>
+            <a:r>
+              <a:rPr lang="de-DE" sz="1200" dirty="0"/>
+              <a:t> real-time </a:t>
+            </a:r>
+            <a:r>
+              <a:rPr lang="de-DE" sz="1200" dirty="0" err="1"/>
+              <a:t>data</a:t>
+            </a:r>
+            <a:r>
+              <a:rPr lang="de-DE" sz="1200" dirty="0"/>
+              <a:t> </a:t>
+            </a:r>
+            <a:r>
+              <a:rPr lang="de-DE" sz="1200" dirty="0" err="1"/>
+              <a:t>processing</a:t>
+            </a:r>
+            <a:r>
+              <a:rPr lang="de-DE" sz="1200" dirty="0"/>
+              <a:t> </a:t>
+            </a:r>
+            <a:r>
+              <a:rPr lang="de-DE" sz="1200" dirty="0" err="1"/>
+              <a:t>architectures</a:t>
+            </a:r>
+            <a:r>
+              <a:rPr lang="de-DE" sz="1200" dirty="0"/>
+              <a:t> </a:t>
+            </a:r>
+            <a:r>
+              <a:rPr lang="de-DE" sz="1200" dirty="0" err="1"/>
+              <a:t>lambda</a:t>
+            </a:r>
+            <a:r>
+              <a:rPr lang="de-DE" sz="1200" dirty="0"/>
+              <a:t> and </a:t>
+            </a:r>
+            <a:r>
+              <a:rPr lang="de-DE" sz="1200" dirty="0" err="1"/>
+              <a:t>kappa</a:t>
+            </a:r>
+            <a:r>
+              <a:rPr lang="de-DE" sz="1200" dirty="0"/>
+              <a:t>.“</a:t>
+            </a:r>
+          </a:p>
+          <a:p>
+            <a:r>
+              <a:rPr lang="de-DE" sz="1200" dirty="0"/>
+              <a:t>3. </a:t>
+            </a:r>
+            <a:r>
+              <a:rPr lang="de-DE" sz="1200" dirty="0" err="1"/>
+              <a:t>Owczarek</a:t>
+            </a:r>
+            <a:r>
+              <a:rPr lang="de-DE" sz="1200" dirty="0"/>
+              <a:t>. “Lambda vs. Kappa Architecture.” URL: https://nexocode.com/blog/posts/lambda-vs-kappa-architecture/</a:t>
+            </a:r>
+          </a:p>
+          <a:p>
+            <a:r>
+              <a:rPr lang="de-DE" sz="1200" dirty="0"/>
+              <a:t>4. </a:t>
+            </a:r>
+            <a:r>
+              <a:rPr lang="de-DE" sz="1200" dirty="0" err="1"/>
+              <a:t>Garg</a:t>
+            </a:r>
+            <a:r>
+              <a:rPr lang="de-DE" sz="1200" dirty="0"/>
+              <a:t>, </a:t>
+            </a:r>
+            <a:r>
+              <a:rPr lang="de-DE" sz="1200" dirty="0" err="1"/>
+              <a:t>Nishant</a:t>
+            </a:r>
+            <a:r>
+              <a:rPr lang="de-DE" sz="1200" dirty="0"/>
+              <a:t>. Apache </a:t>
+            </a:r>
+            <a:r>
+              <a:rPr lang="de-DE" sz="1200" dirty="0" err="1"/>
+              <a:t>kafka</a:t>
+            </a:r>
+            <a:r>
+              <a:rPr lang="de-DE" sz="1200" dirty="0"/>
+              <a:t>. Birmingham, UK: Packt Publishing, 2013.</a:t>
+            </a:r>
+          </a:p>
+          <a:p>
+            <a:r>
+              <a:rPr lang="de-DE" sz="1200" dirty="0"/>
+              <a:t>5. Twitter Blog: https://blog.twitter.com/engineering/en_us/topics/infrastructure/2021/processing-billions-of-events-in-real-time-at-twitter-</a:t>
+            </a:r>
+          </a:p>
+          <a:p>
+            <a:endParaRPr lang="de-DE" sz="1200" dirty="0"/>
+          </a:p>
+          <a:p>
+            <a:endParaRPr lang="de-DE" sz="1200" dirty="0"/>
           </a:p>
           <a:p>
             <a:endParaRPr lang="de-DE" sz="1200" dirty="0"/>
@@ -5879,18 +6456,6 @@
 <file path=ppt/tags/tag5.xml><?xml version="1.0" encoding="utf-8"?>
 <p:tagLst xmlns:a="http://schemas.openxmlformats.org/drawingml/2006/main" xmlns:r="http://schemas.openxmlformats.org/officeDocument/2006/relationships" xmlns:p="http://schemas.openxmlformats.org/presentationml/2006/main">
   <p:tag name="THINKCELLSHAPEDONOTDELETE" val="thinkcellActiveDocDoNotDelete"/>
-</p:tagLst>
-</file>
-
-<file path=ppt/tags/tag6.xml><?xml version="1.0" encoding="utf-8"?>
-<p:tagLst xmlns:a="http://schemas.openxmlformats.org/drawingml/2006/main" xmlns:r="http://schemas.openxmlformats.org/officeDocument/2006/relationships" xmlns:p="http://schemas.openxmlformats.org/presentationml/2006/main">
-  <p:tag name="THINKCELLSHAPEDONOTDELETE" val="thinkcellActiveDocDoNotDelete"/>
-</p:tagLst>
-</file>
-
-<file path=ppt/tags/tag7.xml><?xml version="1.0" encoding="utf-8"?>
-<p:tagLst xmlns:a="http://schemas.openxmlformats.org/drawingml/2006/main" xmlns:r="http://schemas.openxmlformats.org/officeDocument/2006/relationships" xmlns:p="http://schemas.openxmlformats.org/presentationml/2006/main">
-  <p:tag name="THINKCELLSHAPEDONOTDELETE" val="t3XRvQGdmPOx15SKgIX1Ujg"/>
 </p:tagLst>
 </file>
 
@@ -6138,14 +6703,14 @@
         <a:effectLst/>
         <a:extLst>
           <a:ext uri="{909E8E84-426E-40dd-AFC4-6F175D3DCCD1}">
-            <a14:hiddenFill xmlns:a14="http://schemas.microsoft.com/office/drawing/2010/main" xmlns="">
+            <a14:hiddenFill xmlns="" xmlns:a14="http://schemas.microsoft.com/office/drawing/2010/main">
               <a:solidFill>
                 <a:schemeClr val="accent2"/>
               </a:solidFill>
             </a14:hiddenFill>
           </a:ext>
           <a:ext uri="{AF507438-7753-43e0-B8FC-AC1667EBCBE1}">
-            <a14:hiddenEffects xmlns:a14="http://schemas.microsoft.com/office/drawing/2010/main" xmlns="">
+            <a14:hiddenEffects xmlns="" xmlns:a14="http://schemas.microsoft.com/office/drawing/2010/main">
               <a:effectLst>
                 <a:outerShdw blurRad="63500" dist="35921" dir="2700000" algn="ctr" rotWithShape="0">
                   <a:schemeClr val="bg2"/>
@@ -6218,14 +6783,14 @@
         <a:effectLst/>
         <a:extLst>
           <a:ext uri="{909E8E84-426E-40dd-AFC4-6F175D3DCCD1}">
-            <a14:hiddenFill xmlns:a14="http://schemas.microsoft.com/office/drawing/2010/main" xmlns="">
+            <a14:hiddenFill xmlns="" xmlns:a14="http://schemas.microsoft.com/office/drawing/2010/main">
               <a:solidFill>
                 <a:schemeClr val="accent2"/>
               </a:solidFill>
             </a14:hiddenFill>
           </a:ext>
           <a:ext uri="{AF507438-7753-43e0-B8FC-AC1667EBCBE1}">
-            <a14:hiddenEffects xmlns:a14="http://schemas.microsoft.com/office/drawing/2010/main" xmlns="">
+            <a14:hiddenEffects xmlns="" xmlns:a14="http://schemas.microsoft.com/office/drawing/2010/main">
               <a:effectLst>
                 <a:outerShdw blurRad="63500" dist="35921" dir="2700000" algn="ctr" rotWithShape="0">
                   <a:schemeClr val="bg2"/>
@@ -7001,7 +7566,7 @@
 
 <file path=ppt/webextensions/taskpanes.xml><?xml version="1.0" encoding="utf-8"?>
 <wetp:taskpanes xmlns:wetp="http://schemas.microsoft.com/office/webextensions/taskpanes/2010/11">
-  <wetp:taskpane dockstate="right" visibility="0" width="350" row="1">
+  <wetp:taskpane dockstate="right" visibility="0" width="438" row="2">
     <wetp:webextensionref xmlns:r="http://schemas.openxmlformats.org/officeDocument/2006/relationships" r:id="rId1"/>
   </wetp:taskpane>
 </wetp:taskpanes>

</xml_diff>